<commit_message>
update experiment and details
</commit_message>
<xml_diff>
--- a/figures/fixed_train_exp.pptx
+++ b/figures/fixed_train_exp.pptx
@@ -113,6 +113,3431 @@
 </file>
 
 <file path=ppt/charts/chart1.xml><?xml version="1.0" encoding="utf-8"?>
+<c:chartSpace xmlns:c="http://schemas.openxmlformats.org/drawingml/2006/chart" xmlns:a="http://schemas.openxmlformats.org/drawingml/2006/main" xmlns:r="http://schemas.openxmlformats.org/officeDocument/2006/relationships" xmlns:c16r2="http://schemas.microsoft.com/office/drawing/2015/06/chart">
+  <c:date1904 val="0"/>
+  <c:lang val="zh-CN"/>
+  <c:roundedCorners val="0"/>
+  <mc:AlternateContent xmlns:mc="http://schemas.openxmlformats.org/markup-compatibility/2006">
+    <mc:Choice xmlns:c14="http://schemas.microsoft.com/office/drawing/2007/8/2/chart" Requires="c14">
+      <c14:style val="102"/>
+    </mc:Choice>
+    <mc:Fallback>
+      <c:style val="2"/>
+    </mc:Fallback>
+  </mc:AlternateContent>
+  <c:chart>
+    <c:autoTitleDeleted val="1"/>
+    <c:plotArea>
+      <c:layout/>
+      <c:scatterChart>
+        <c:scatterStyle val="lineMarker"/>
+        <c:varyColors val="0"/>
+        <c:ser>
+          <c:idx val="0"/>
+          <c:order val="0"/>
+          <c:tx>
+            <c:strRef>
+              <c:f>'wg32'!$B$1</c:f>
+              <c:strCache>
+                <c:ptCount val="1"/>
+                <c:pt idx="0">
+                  <c:v>baseline</c:v>
+                </c:pt>
+              </c:strCache>
+            </c:strRef>
+          </c:tx>
+          <c:spPr>
+            <a:ln w="6350" cap="rnd">
+              <a:solidFill>
+                <a:schemeClr val="accent1"/>
+              </a:solidFill>
+              <a:round/>
+            </a:ln>
+            <a:effectLst/>
+          </c:spPr>
+          <c:marker>
+            <c:symbol val="circle"/>
+            <c:size val="2"/>
+            <c:spPr>
+              <a:solidFill>
+                <a:schemeClr val="accent1"/>
+              </a:solidFill>
+              <a:ln w="9525">
+                <a:noFill/>
+              </a:ln>
+              <a:effectLst/>
+            </c:spPr>
+          </c:marker>
+          <c:xVal>
+            <c:numRef>
+              <c:f>'wg32'!$A$2:$A$61</c:f>
+              <c:numCache>
+                <c:formatCode>General</c:formatCode>
+                <c:ptCount val="60"/>
+                <c:pt idx="0">
+                  <c:v>5</c:v>
+                </c:pt>
+                <c:pt idx="1">
+                  <c:v>10</c:v>
+                </c:pt>
+                <c:pt idx="2">
+                  <c:v>15</c:v>
+                </c:pt>
+                <c:pt idx="3">
+                  <c:v>20</c:v>
+                </c:pt>
+                <c:pt idx="4">
+                  <c:v>25</c:v>
+                </c:pt>
+                <c:pt idx="5">
+                  <c:v>30</c:v>
+                </c:pt>
+                <c:pt idx="6">
+                  <c:v>35</c:v>
+                </c:pt>
+                <c:pt idx="7">
+                  <c:v>40</c:v>
+                </c:pt>
+                <c:pt idx="8">
+                  <c:v>45</c:v>
+                </c:pt>
+                <c:pt idx="9">
+                  <c:v>50</c:v>
+                </c:pt>
+                <c:pt idx="10">
+                  <c:v>55</c:v>
+                </c:pt>
+                <c:pt idx="11">
+                  <c:v>60</c:v>
+                </c:pt>
+                <c:pt idx="12">
+                  <c:v>65</c:v>
+                </c:pt>
+                <c:pt idx="13">
+                  <c:v>70</c:v>
+                </c:pt>
+                <c:pt idx="14">
+                  <c:v>75</c:v>
+                </c:pt>
+                <c:pt idx="15">
+                  <c:v>80</c:v>
+                </c:pt>
+                <c:pt idx="16">
+                  <c:v>85</c:v>
+                </c:pt>
+                <c:pt idx="17">
+                  <c:v>90</c:v>
+                </c:pt>
+                <c:pt idx="18">
+                  <c:v>95</c:v>
+                </c:pt>
+                <c:pt idx="19">
+                  <c:v>100</c:v>
+                </c:pt>
+                <c:pt idx="20">
+                  <c:v>105</c:v>
+                </c:pt>
+                <c:pt idx="21">
+                  <c:v>110</c:v>
+                </c:pt>
+                <c:pt idx="22">
+                  <c:v>115</c:v>
+                </c:pt>
+                <c:pt idx="23">
+                  <c:v>120</c:v>
+                </c:pt>
+                <c:pt idx="24">
+                  <c:v>125</c:v>
+                </c:pt>
+                <c:pt idx="25">
+                  <c:v>130</c:v>
+                </c:pt>
+                <c:pt idx="26">
+                  <c:v>135</c:v>
+                </c:pt>
+                <c:pt idx="27">
+                  <c:v>140</c:v>
+                </c:pt>
+                <c:pt idx="28">
+                  <c:v>145</c:v>
+                </c:pt>
+                <c:pt idx="29">
+                  <c:v>150</c:v>
+                </c:pt>
+                <c:pt idx="30">
+                  <c:v>155</c:v>
+                </c:pt>
+                <c:pt idx="31">
+                  <c:v>160</c:v>
+                </c:pt>
+                <c:pt idx="32">
+                  <c:v>165</c:v>
+                </c:pt>
+                <c:pt idx="33">
+                  <c:v>170</c:v>
+                </c:pt>
+                <c:pt idx="34">
+                  <c:v>175</c:v>
+                </c:pt>
+                <c:pt idx="35">
+                  <c:v>180</c:v>
+                </c:pt>
+                <c:pt idx="36">
+                  <c:v>185</c:v>
+                </c:pt>
+                <c:pt idx="37">
+                  <c:v>190</c:v>
+                </c:pt>
+                <c:pt idx="38">
+                  <c:v>195</c:v>
+                </c:pt>
+                <c:pt idx="39">
+                  <c:v>200</c:v>
+                </c:pt>
+                <c:pt idx="40">
+                  <c:v>205</c:v>
+                </c:pt>
+                <c:pt idx="41">
+                  <c:v>210</c:v>
+                </c:pt>
+                <c:pt idx="42">
+                  <c:v>215</c:v>
+                </c:pt>
+                <c:pt idx="43">
+                  <c:v>220</c:v>
+                </c:pt>
+                <c:pt idx="44">
+                  <c:v>225</c:v>
+                </c:pt>
+                <c:pt idx="45">
+                  <c:v>230</c:v>
+                </c:pt>
+                <c:pt idx="46">
+                  <c:v>235</c:v>
+                </c:pt>
+                <c:pt idx="47">
+                  <c:v>240</c:v>
+                </c:pt>
+                <c:pt idx="48">
+                  <c:v>245</c:v>
+                </c:pt>
+                <c:pt idx="49">
+                  <c:v>250</c:v>
+                </c:pt>
+                <c:pt idx="50">
+                  <c:v>255</c:v>
+                </c:pt>
+                <c:pt idx="51">
+                  <c:v>260</c:v>
+                </c:pt>
+                <c:pt idx="52">
+                  <c:v>265</c:v>
+                </c:pt>
+                <c:pt idx="53">
+                  <c:v>270</c:v>
+                </c:pt>
+                <c:pt idx="54">
+                  <c:v>275</c:v>
+                </c:pt>
+                <c:pt idx="55">
+                  <c:v>280</c:v>
+                </c:pt>
+                <c:pt idx="56">
+                  <c:v>285</c:v>
+                </c:pt>
+                <c:pt idx="57">
+                  <c:v>290</c:v>
+                </c:pt>
+                <c:pt idx="58">
+                  <c:v>295</c:v>
+                </c:pt>
+                <c:pt idx="59">
+                  <c:v>300</c:v>
+                </c:pt>
+              </c:numCache>
+            </c:numRef>
+          </c:xVal>
+          <c:yVal>
+            <c:numRef>
+              <c:f>'wg32'!$B$2:$B$61</c:f>
+              <c:numCache>
+                <c:formatCode>General</c:formatCode>
+                <c:ptCount val="60"/>
+                <c:pt idx="0">
+                  <c:v>60.45</c:v>
+                </c:pt>
+                <c:pt idx="1">
+                  <c:v>69.930000000000007</c:v>
+                </c:pt>
+                <c:pt idx="2">
+                  <c:v>77.08</c:v>
+                </c:pt>
+                <c:pt idx="3">
+                  <c:v>75.900000000000006</c:v>
+                </c:pt>
+                <c:pt idx="4">
+                  <c:v>80.39</c:v>
+                </c:pt>
+                <c:pt idx="5">
+                  <c:v>80.67</c:v>
+                </c:pt>
+                <c:pt idx="6">
+                  <c:v>84.4</c:v>
+                </c:pt>
+                <c:pt idx="7">
+                  <c:v>84.72</c:v>
+                </c:pt>
+                <c:pt idx="8">
+                  <c:v>85.25</c:v>
+                </c:pt>
+                <c:pt idx="9">
+                  <c:v>84.71</c:v>
+                </c:pt>
+                <c:pt idx="10">
+                  <c:v>84.07</c:v>
+                </c:pt>
+                <c:pt idx="11">
+                  <c:v>85.34</c:v>
+                </c:pt>
+                <c:pt idx="12">
+                  <c:v>88.56</c:v>
+                </c:pt>
+                <c:pt idx="13">
+                  <c:v>87.99</c:v>
+                </c:pt>
+                <c:pt idx="14">
+                  <c:v>88.68</c:v>
+                </c:pt>
+                <c:pt idx="15">
+                  <c:v>87.38</c:v>
+                </c:pt>
+                <c:pt idx="16">
+                  <c:v>87.96</c:v>
+                </c:pt>
+                <c:pt idx="17">
+                  <c:v>87.94</c:v>
+                </c:pt>
+                <c:pt idx="18">
+                  <c:v>89.4</c:v>
+                </c:pt>
+                <c:pt idx="19">
+                  <c:v>89.32</c:v>
+                </c:pt>
+                <c:pt idx="20">
+                  <c:v>89.42</c:v>
+                </c:pt>
+                <c:pt idx="21">
+                  <c:v>89.44</c:v>
+                </c:pt>
+                <c:pt idx="22">
+                  <c:v>89.67</c:v>
+                </c:pt>
+                <c:pt idx="23">
+                  <c:v>89.29</c:v>
+                </c:pt>
+                <c:pt idx="24">
+                  <c:v>90.41</c:v>
+                </c:pt>
+                <c:pt idx="25">
+                  <c:v>90.19</c:v>
+                </c:pt>
+                <c:pt idx="26">
+                  <c:v>90.36</c:v>
+                </c:pt>
+                <c:pt idx="27">
+                  <c:v>90.52</c:v>
+                </c:pt>
+                <c:pt idx="28">
+                  <c:v>88.41</c:v>
+                </c:pt>
+                <c:pt idx="29">
+                  <c:v>89.95</c:v>
+                </c:pt>
+                <c:pt idx="30">
+                  <c:v>89.75</c:v>
+                </c:pt>
+                <c:pt idx="31">
+                  <c:v>90.31</c:v>
+                </c:pt>
+                <c:pt idx="32">
+                  <c:v>89.88</c:v>
+                </c:pt>
+                <c:pt idx="33">
+                  <c:v>90.32</c:v>
+                </c:pt>
+                <c:pt idx="34">
+                  <c:v>89.55</c:v>
+                </c:pt>
+                <c:pt idx="35">
+                  <c:v>89.88</c:v>
+                </c:pt>
+                <c:pt idx="36">
+                  <c:v>90.47</c:v>
+                </c:pt>
+                <c:pt idx="37">
+                  <c:v>90.29</c:v>
+                </c:pt>
+                <c:pt idx="38">
+                  <c:v>90.07</c:v>
+                </c:pt>
+                <c:pt idx="39">
+                  <c:v>90.45</c:v>
+                </c:pt>
+                <c:pt idx="40">
+                  <c:v>90.43</c:v>
+                </c:pt>
+                <c:pt idx="41">
+                  <c:v>90.23</c:v>
+                </c:pt>
+                <c:pt idx="42">
+                  <c:v>89.95</c:v>
+                </c:pt>
+                <c:pt idx="43">
+                  <c:v>90.55</c:v>
+                </c:pt>
+                <c:pt idx="44">
+                  <c:v>90.61</c:v>
+                </c:pt>
+                <c:pt idx="45">
+                  <c:v>90.5</c:v>
+                </c:pt>
+                <c:pt idx="46">
+                  <c:v>90.79</c:v>
+                </c:pt>
+                <c:pt idx="47">
+                  <c:v>90.62</c:v>
+                </c:pt>
+              </c:numCache>
+            </c:numRef>
+          </c:yVal>
+          <c:smooth val="0"/>
+          <c:extLst>
+            <c:ext xmlns:c16="http://schemas.microsoft.com/office/drawing/2014/chart" uri="{C3380CC4-5D6E-409C-BE32-E72D297353CC}">
+              <c16:uniqueId val="{00000000-A68B-4CB4-8153-6AA11D17B178}"/>
+            </c:ext>
+          </c:extLst>
+        </c:ser>
+        <c:ser>
+          <c:idx val="1"/>
+          <c:order val="1"/>
+          <c:tx>
+            <c:strRef>
+              <c:f>'wg32'!$C$1</c:f>
+              <c:strCache>
+                <c:ptCount val="1"/>
+                <c:pt idx="0">
+                  <c:v>p30</c:v>
+                </c:pt>
+              </c:strCache>
+            </c:strRef>
+          </c:tx>
+          <c:spPr>
+            <a:ln w="6350" cap="rnd">
+              <a:solidFill>
+                <a:schemeClr val="accent2"/>
+              </a:solidFill>
+              <a:round/>
+            </a:ln>
+            <a:effectLst/>
+          </c:spPr>
+          <c:marker>
+            <c:symbol val="circle"/>
+            <c:size val="2"/>
+            <c:spPr>
+              <a:solidFill>
+                <a:schemeClr val="accent2"/>
+              </a:solidFill>
+              <a:ln w="9525">
+                <a:noFill/>
+              </a:ln>
+              <a:effectLst/>
+            </c:spPr>
+          </c:marker>
+          <c:xVal>
+            <c:numRef>
+              <c:f>'wg32'!$A$2:$A$61</c:f>
+              <c:numCache>
+                <c:formatCode>General</c:formatCode>
+                <c:ptCount val="60"/>
+                <c:pt idx="0">
+                  <c:v>5</c:v>
+                </c:pt>
+                <c:pt idx="1">
+                  <c:v>10</c:v>
+                </c:pt>
+                <c:pt idx="2">
+                  <c:v>15</c:v>
+                </c:pt>
+                <c:pt idx="3">
+                  <c:v>20</c:v>
+                </c:pt>
+                <c:pt idx="4">
+                  <c:v>25</c:v>
+                </c:pt>
+                <c:pt idx="5">
+                  <c:v>30</c:v>
+                </c:pt>
+                <c:pt idx="6">
+                  <c:v>35</c:v>
+                </c:pt>
+                <c:pt idx="7">
+                  <c:v>40</c:v>
+                </c:pt>
+                <c:pt idx="8">
+                  <c:v>45</c:v>
+                </c:pt>
+                <c:pt idx="9">
+                  <c:v>50</c:v>
+                </c:pt>
+                <c:pt idx="10">
+                  <c:v>55</c:v>
+                </c:pt>
+                <c:pt idx="11">
+                  <c:v>60</c:v>
+                </c:pt>
+                <c:pt idx="12">
+                  <c:v>65</c:v>
+                </c:pt>
+                <c:pt idx="13">
+                  <c:v>70</c:v>
+                </c:pt>
+                <c:pt idx="14">
+                  <c:v>75</c:v>
+                </c:pt>
+                <c:pt idx="15">
+                  <c:v>80</c:v>
+                </c:pt>
+                <c:pt idx="16">
+                  <c:v>85</c:v>
+                </c:pt>
+                <c:pt idx="17">
+                  <c:v>90</c:v>
+                </c:pt>
+                <c:pt idx="18">
+                  <c:v>95</c:v>
+                </c:pt>
+                <c:pt idx="19">
+                  <c:v>100</c:v>
+                </c:pt>
+                <c:pt idx="20">
+                  <c:v>105</c:v>
+                </c:pt>
+                <c:pt idx="21">
+                  <c:v>110</c:v>
+                </c:pt>
+                <c:pt idx="22">
+                  <c:v>115</c:v>
+                </c:pt>
+                <c:pt idx="23">
+                  <c:v>120</c:v>
+                </c:pt>
+                <c:pt idx="24">
+                  <c:v>125</c:v>
+                </c:pt>
+                <c:pt idx="25">
+                  <c:v>130</c:v>
+                </c:pt>
+                <c:pt idx="26">
+                  <c:v>135</c:v>
+                </c:pt>
+                <c:pt idx="27">
+                  <c:v>140</c:v>
+                </c:pt>
+                <c:pt idx="28">
+                  <c:v>145</c:v>
+                </c:pt>
+                <c:pt idx="29">
+                  <c:v>150</c:v>
+                </c:pt>
+                <c:pt idx="30">
+                  <c:v>155</c:v>
+                </c:pt>
+                <c:pt idx="31">
+                  <c:v>160</c:v>
+                </c:pt>
+                <c:pt idx="32">
+                  <c:v>165</c:v>
+                </c:pt>
+                <c:pt idx="33">
+                  <c:v>170</c:v>
+                </c:pt>
+                <c:pt idx="34">
+                  <c:v>175</c:v>
+                </c:pt>
+                <c:pt idx="35">
+                  <c:v>180</c:v>
+                </c:pt>
+                <c:pt idx="36">
+                  <c:v>185</c:v>
+                </c:pt>
+                <c:pt idx="37">
+                  <c:v>190</c:v>
+                </c:pt>
+                <c:pt idx="38">
+                  <c:v>195</c:v>
+                </c:pt>
+                <c:pt idx="39">
+                  <c:v>200</c:v>
+                </c:pt>
+                <c:pt idx="40">
+                  <c:v>205</c:v>
+                </c:pt>
+                <c:pt idx="41">
+                  <c:v>210</c:v>
+                </c:pt>
+                <c:pt idx="42">
+                  <c:v>215</c:v>
+                </c:pt>
+                <c:pt idx="43">
+                  <c:v>220</c:v>
+                </c:pt>
+                <c:pt idx="44">
+                  <c:v>225</c:v>
+                </c:pt>
+                <c:pt idx="45">
+                  <c:v>230</c:v>
+                </c:pt>
+                <c:pt idx="46">
+                  <c:v>235</c:v>
+                </c:pt>
+                <c:pt idx="47">
+                  <c:v>240</c:v>
+                </c:pt>
+                <c:pt idx="48">
+                  <c:v>245</c:v>
+                </c:pt>
+                <c:pt idx="49">
+                  <c:v>250</c:v>
+                </c:pt>
+                <c:pt idx="50">
+                  <c:v>255</c:v>
+                </c:pt>
+                <c:pt idx="51">
+                  <c:v>260</c:v>
+                </c:pt>
+                <c:pt idx="52">
+                  <c:v>265</c:v>
+                </c:pt>
+                <c:pt idx="53">
+                  <c:v>270</c:v>
+                </c:pt>
+                <c:pt idx="54">
+                  <c:v>275</c:v>
+                </c:pt>
+                <c:pt idx="55">
+                  <c:v>280</c:v>
+                </c:pt>
+                <c:pt idx="56">
+                  <c:v>285</c:v>
+                </c:pt>
+                <c:pt idx="57">
+                  <c:v>290</c:v>
+                </c:pt>
+                <c:pt idx="58">
+                  <c:v>295</c:v>
+                </c:pt>
+                <c:pt idx="59">
+                  <c:v>300</c:v>
+                </c:pt>
+              </c:numCache>
+            </c:numRef>
+          </c:xVal>
+          <c:yVal>
+            <c:numRef>
+              <c:f>'wg32'!$C$2:$C$61</c:f>
+              <c:numCache>
+                <c:formatCode>General</c:formatCode>
+                <c:ptCount val="60"/>
+                <c:pt idx="6">
+                  <c:v>86.12</c:v>
+                </c:pt>
+                <c:pt idx="7">
+                  <c:v>86.79</c:v>
+                </c:pt>
+                <c:pt idx="8">
+                  <c:v>87.08</c:v>
+                </c:pt>
+                <c:pt idx="9">
+                  <c:v>87.76</c:v>
+                </c:pt>
+                <c:pt idx="10">
+                  <c:v>87.66</c:v>
+                </c:pt>
+                <c:pt idx="11">
+                  <c:v>87.66</c:v>
+                </c:pt>
+                <c:pt idx="12">
+                  <c:v>88.21</c:v>
+                </c:pt>
+                <c:pt idx="13">
+                  <c:v>88.09</c:v>
+                </c:pt>
+                <c:pt idx="14">
+                  <c:v>88.34</c:v>
+                </c:pt>
+                <c:pt idx="15">
+                  <c:v>88.08</c:v>
+                </c:pt>
+                <c:pt idx="16">
+                  <c:v>88.47</c:v>
+                </c:pt>
+                <c:pt idx="17">
+                  <c:v>88.41</c:v>
+                </c:pt>
+                <c:pt idx="18">
+                  <c:v>88.45</c:v>
+                </c:pt>
+                <c:pt idx="19">
+                  <c:v>88.5</c:v>
+                </c:pt>
+                <c:pt idx="20">
+                  <c:v>88.55</c:v>
+                </c:pt>
+                <c:pt idx="21">
+                  <c:v>88.5</c:v>
+                </c:pt>
+                <c:pt idx="22">
+                  <c:v>88.52</c:v>
+                </c:pt>
+                <c:pt idx="23">
+                  <c:v>88.66</c:v>
+                </c:pt>
+                <c:pt idx="24">
+                  <c:v>88.6</c:v>
+                </c:pt>
+                <c:pt idx="25">
+                  <c:v>88.72</c:v>
+                </c:pt>
+                <c:pt idx="26">
+                  <c:v>88.68</c:v>
+                </c:pt>
+                <c:pt idx="27">
+                  <c:v>88.75</c:v>
+                </c:pt>
+                <c:pt idx="28">
+                  <c:v>88.89</c:v>
+                </c:pt>
+                <c:pt idx="29">
+                  <c:v>88.71</c:v>
+                </c:pt>
+                <c:pt idx="30">
+                  <c:v>88.69</c:v>
+                </c:pt>
+                <c:pt idx="31">
+                  <c:v>88.74</c:v>
+                </c:pt>
+                <c:pt idx="32">
+                  <c:v>88.86</c:v>
+                </c:pt>
+                <c:pt idx="33">
+                  <c:v>88.8</c:v>
+                </c:pt>
+                <c:pt idx="34">
+                  <c:v>88.72</c:v>
+                </c:pt>
+                <c:pt idx="35">
+                  <c:v>88.71</c:v>
+                </c:pt>
+                <c:pt idx="36">
+                  <c:v>88.79</c:v>
+                </c:pt>
+                <c:pt idx="37">
+                  <c:v>88.83</c:v>
+                </c:pt>
+                <c:pt idx="38">
+                  <c:v>88.93</c:v>
+                </c:pt>
+                <c:pt idx="39">
+                  <c:v>88.92</c:v>
+                </c:pt>
+                <c:pt idx="40">
+                  <c:v>88.85</c:v>
+                </c:pt>
+                <c:pt idx="41">
+                  <c:v>88.93</c:v>
+                </c:pt>
+                <c:pt idx="42">
+                  <c:v>88.82</c:v>
+                </c:pt>
+                <c:pt idx="43">
+                  <c:v>88.81</c:v>
+                </c:pt>
+                <c:pt idx="44">
+                  <c:v>88.87</c:v>
+                </c:pt>
+                <c:pt idx="45">
+                  <c:v>88.91</c:v>
+                </c:pt>
+                <c:pt idx="46">
+                  <c:v>88.78</c:v>
+                </c:pt>
+                <c:pt idx="47">
+                  <c:v>88.76</c:v>
+                </c:pt>
+                <c:pt idx="48">
+                  <c:v>88.85</c:v>
+                </c:pt>
+                <c:pt idx="49">
+                  <c:v>88.83</c:v>
+                </c:pt>
+                <c:pt idx="50">
+                  <c:v>88.86</c:v>
+                </c:pt>
+                <c:pt idx="51">
+                  <c:v>88.8</c:v>
+                </c:pt>
+                <c:pt idx="52">
+                  <c:v>88.87</c:v>
+                </c:pt>
+                <c:pt idx="53">
+                  <c:v>88.89</c:v>
+                </c:pt>
+                <c:pt idx="54">
+                  <c:v>88.85</c:v>
+                </c:pt>
+                <c:pt idx="55">
+                  <c:v>88.84</c:v>
+                </c:pt>
+                <c:pt idx="56">
+                  <c:v>88.87</c:v>
+                </c:pt>
+                <c:pt idx="57">
+                  <c:v>88.85</c:v>
+                </c:pt>
+                <c:pt idx="58">
+                  <c:v>88.84</c:v>
+                </c:pt>
+                <c:pt idx="59">
+                  <c:v>88.82</c:v>
+                </c:pt>
+              </c:numCache>
+            </c:numRef>
+          </c:yVal>
+          <c:smooth val="0"/>
+          <c:extLst>
+            <c:ext xmlns:c16="http://schemas.microsoft.com/office/drawing/2014/chart" uri="{C3380CC4-5D6E-409C-BE32-E72D297353CC}">
+              <c16:uniqueId val="{00000001-A68B-4CB4-8153-6AA11D17B178}"/>
+            </c:ext>
+          </c:extLst>
+        </c:ser>
+        <c:ser>
+          <c:idx val="2"/>
+          <c:order val="2"/>
+          <c:tx>
+            <c:strRef>
+              <c:f>'wg32'!$D$1</c:f>
+              <c:strCache>
+                <c:ptCount val="1"/>
+                <c:pt idx="0">
+                  <c:v>p60</c:v>
+                </c:pt>
+              </c:strCache>
+            </c:strRef>
+          </c:tx>
+          <c:spPr>
+            <a:ln w="6350" cap="rnd">
+              <a:solidFill>
+                <a:schemeClr val="accent3"/>
+              </a:solidFill>
+              <a:round/>
+            </a:ln>
+            <a:effectLst/>
+          </c:spPr>
+          <c:marker>
+            <c:symbol val="circle"/>
+            <c:size val="2"/>
+            <c:spPr>
+              <a:solidFill>
+                <a:schemeClr val="accent3"/>
+              </a:solidFill>
+              <a:ln w="9525">
+                <a:noFill/>
+              </a:ln>
+              <a:effectLst/>
+            </c:spPr>
+          </c:marker>
+          <c:xVal>
+            <c:numRef>
+              <c:f>'wg32'!$A$2:$A$61</c:f>
+              <c:numCache>
+                <c:formatCode>General</c:formatCode>
+                <c:ptCount val="60"/>
+                <c:pt idx="0">
+                  <c:v>5</c:v>
+                </c:pt>
+                <c:pt idx="1">
+                  <c:v>10</c:v>
+                </c:pt>
+                <c:pt idx="2">
+                  <c:v>15</c:v>
+                </c:pt>
+                <c:pt idx="3">
+                  <c:v>20</c:v>
+                </c:pt>
+                <c:pt idx="4">
+                  <c:v>25</c:v>
+                </c:pt>
+                <c:pt idx="5">
+                  <c:v>30</c:v>
+                </c:pt>
+                <c:pt idx="6">
+                  <c:v>35</c:v>
+                </c:pt>
+                <c:pt idx="7">
+                  <c:v>40</c:v>
+                </c:pt>
+                <c:pt idx="8">
+                  <c:v>45</c:v>
+                </c:pt>
+                <c:pt idx="9">
+                  <c:v>50</c:v>
+                </c:pt>
+                <c:pt idx="10">
+                  <c:v>55</c:v>
+                </c:pt>
+                <c:pt idx="11">
+                  <c:v>60</c:v>
+                </c:pt>
+                <c:pt idx="12">
+                  <c:v>65</c:v>
+                </c:pt>
+                <c:pt idx="13">
+                  <c:v>70</c:v>
+                </c:pt>
+                <c:pt idx="14">
+                  <c:v>75</c:v>
+                </c:pt>
+                <c:pt idx="15">
+                  <c:v>80</c:v>
+                </c:pt>
+                <c:pt idx="16">
+                  <c:v>85</c:v>
+                </c:pt>
+                <c:pt idx="17">
+                  <c:v>90</c:v>
+                </c:pt>
+                <c:pt idx="18">
+                  <c:v>95</c:v>
+                </c:pt>
+                <c:pt idx="19">
+                  <c:v>100</c:v>
+                </c:pt>
+                <c:pt idx="20">
+                  <c:v>105</c:v>
+                </c:pt>
+                <c:pt idx="21">
+                  <c:v>110</c:v>
+                </c:pt>
+                <c:pt idx="22">
+                  <c:v>115</c:v>
+                </c:pt>
+                <c:pt idx="23">
+                  <c:v>120</c:v>
+                </c:pt>
+                <c:pt idx="24">
+                  <c:v>125</c:v>
+                </c:pt>
+                <c:pt idx="25">
+                  <c:v>130</c:v>
+                </c:pt>
+                <c:pt idx="26">
+                  <c:v>135</c:v>
+                </c:pt>
+                <c:pt idx="27">
+                  <c:v>140</c:v>
+                </c:pt>
+                <c:pt idx="28">
+                  <c:v>145</c:v>
+                </c:pt>
+                <c:pt idx="29">
+                  <c:v>150</c:v>
+                </c:pt>
+                <c:pt idx="30">
+                  <c:v>155</c:v>
+                </c:pt>
+                <c:pt idx="31">
+                  <c:v>160</c:v>
+                </c:pt>
+                <c:pt idx="32">
+                  <c:v>165</c:v>
+                </c:pt>
+                <c:pt idx="33">
+                  <c:v>170</c:v>
+                </c:pt>
+                <c:pt idx="34">
+                  <c:v>175</c:v>
+                </c:pt>
+                <c:pt idx="35">
+                  <c:v>180</c:v>
+                </c:pt>
+                <c:pt idx="36">
+                  <c:v>185</c:v>
+                </c:pt>
+                <c:pt idx="37">
+                  <c:v>190</c:v>
+                </c:pt>
+                <c:pt idx="38">
+                  <c:v>195</c:v>
+                </c:pt>
+                <c:pt idx="39">
+                  <c:v>200</c:v>
+                </c:pt>
+                <c:pt idx="40">
+                  <c:v>205</c:v>
+                </c:pt>
+                <c:pt idx="41">
+                  <c:v>210</c:v>
+                </c:pt>
+                <c:pt idx="42">
+                  <c:v>215</c:v>
+                </c:pt>
+                <c:pt idx="43">
+                  <c:v>220</c:v>
+                </c:pt>
+                <c:pt idx="44">
+                  <c:v>225</c:v>
+                </c:pt>
+                <c:pt idx="45">
+                  <c:v>230</c:v>
+                </c:pt>
+                <c:pt idx="46">
+                  <c:v>235</c:v>
+                </c:pt>
+                <c:pt idx="47">
+                  <c:v>240</c:v>
+                </c:pt>
+                <c:pt idx="48">
+                  <c:v>245</c:v>
+                </c:pt>
+                <c:pt idx="49">
+                  <c:v>250</c:v>
+                </c:pt>
+                <c:pt idx="50">
+                  <c:v>255</c:v>
+                </c:pt>
+                <c:pt idx="51">
+                  <c:v>260</c:v>
+                </c:pt>
+                <c:pt idx="52">
+                  <c:v>265</c:v>
+                </c:pt>
+                <c:pt idx="53">
+                  <c:v>270</c:v>
+                </c:pt>
+                <c:pt idx="54">
+                  <c:v>275</c:v>
+                </c:pt>
+                <c:pt idx="55">
+                  <c:v>280</c:v>
+                </c:pt>
+                <c:pt idx="56">
+                  <c:v>285</c:v>
+                </c:pt>
+                <c:pt idx="57">
+                  <c:v>290</c:v>
+                </c:pt>
+                <c:pt idx="58">
+                  <c:v>295</c:v>
+                </c:pt>
+                <c:pt idx="59">
+                  <c:v>300</c:v>
+                </c:pt>
+              </c:numCache>
+            </c:numRef>
+          </c:xVal>
+          <c:yVal>
+            <c:numRef>
+              <c:f>'wg32'!$D$2:$D$61</c:f>
+              <c:numCache>
+                <c:formatCode>General</c:formatCode>
+                <c:ptCount val="60"/>
+                <c:pt idx="12">
+                  <c:v>88.91</c:v>
+                </c:pt>
+                <c:pt idx="13">
+                  <c:v>89.76</c:v>
+                </c:pt>
+                <c:pt idx="14">
+                  <c:v>89.66</c:v>
+                </c:pt>
+                <c:pt idx="15">
+                  <c:v>90.09</c:v>
+                </c:pt>
+                <c:pt idx="16">
+                  <c:v>89.99</c:v>
+                </c:pt>
+                <c:pt idx="17">
+                  <c:v>90.39</c:v>
+                </c:pt>
+                <c:pt idx="18">
+                  <c:v>90.35</c:v>
+                </c:pt>
+                <c:pt idx="19">
+                  <c:v>90.33</c:v>
+                </c:pt>
+                <c:pt idx="20">
+                  <c:v>90.4</c:v>
+                </c:pt>
+                <c:pt idx="21">
+                  <c:v>90.42</c:v>
+                </c:pt>
+                <c:pt idx="22">
+                  <c:v>90.33</c:v>
+                </c:pt>
+                <c:pt idx="23">
+                  <c:v>90.34</c:v>
+                </c:pt>
+                <c:pt idx="24">
+                  <c:v>90.52</c:v>
+                </c:pt>
+                <c:pt idx="25">
+                  <c:v>90.46</c:v>
+                </c:pt>
+                <c:pt idx="26">
+                  <c:v>90.47</c:v>
+                </c:pt>
+                <c:pt idx="27">
+                  <c:v>90.57</c:v>
+                </c:pt>
+                <c:pt idx="28">
+                  <c:v>90.54</c:v>
+                </c:pt>
+                <c:pt idx="29">
+                  <c:v>90.6</c:v>
+                </c:pt>
+                <c:pt idx="30">
+                  <c:v>90.58</c:v>
+                </c:pt>
+                <c:pt idx="31">
+                  <c:v>90.55</c:v>
+                </c:pt>
+                <c:pt idx="32">
+                  <c:v>90.54</c:v>
+                </c:pt>
+                <c:pt idx="33">
+                  <c:v>90.44</c:v>
+                </c:pt>
+                <c:pt idx="34">
+                  <c:v>90.55</c:v>
+                </c:pt>
+                <c:pt idx="35">
+                  <c:v>90.5</c:v>
+                </c:pt>
+                <c:pt idx="36">
+                  <c:v>90.49</c:v>
+                </c:pt>
+                <c:pt idx="37">
+                  <c:v>90.5</c:v>
+                </c:pt>
+                <c:pt idx="38">
+                  <c:v>90.51</c:v>
+                </c:pt>
+                <c:pt idx="39">
+                  <c:v>90.56</c:v>
+                </c:pt>
+                <c:pt idx="40">
+                  <c:v>90.58</c:v>
+                </c:pt>
+                <c:pt idx="41">
+                  <c:v>90.56</c:v>
+                </c:pt>
+                <c:pt idx="42">
+                  <c:v>90.59</c:v>
+                </c:pt>
+                <c:pt idx="43">
+                  <c:v>90.64</c:v>
+                </c:pt>
+                <c:pt idx="44">
+                  <c:v>90.39</c:v>
+                </c:pt>
+                <c:pt idx="45">
+                  <c:v>90.47</c:v>
+                </c:pt>
+                <c:pt idx="46">
+                  <c:v>90.55</c:v>
+                </c:pt>
+                <c:pt idx="47">
+                  <c:v>90.5</c:v>
+                </c:pt>
+                <c:pt idx="48">
+                  <c:v>90.53</c:v>
+                </c:pt>
+                <c:pt idx="49">
+                  <c:v>90.51</c:v>
+                </c:pt>
+                <c:pt idx="50">
+                  <c:v>90.53</c:v>
+                </c:pt>
+                <c:pt idx="51">
+                  <c:v>90.45</c:v>
+                </c:pt>
+                <c:pt idx="52">
+                  <c:v>90.5</c:v>
+                </c:pt>
+                <c:pt idx="53">
+                  <c:v>90.59</c:v>
+                </c:pt>
+                <c:pt idx="54">
+                  <c:v>90.53</c:v>
+                </c:pt>
+                <c:pt idx="55">
+                  <c:v>90.5</c:v>
+                </c:pt>
+                <c:pt idx="56">
+                  <c:v>90.51</c:v>
+                </c:pt>
+                <c:pt idx="57">
+                  <c:v>90.55</c:v>
+                </c:pt>
+                <c:pt idx="58">
+                  <c:v>90.5</c:v>
+                </c:pt>
+                <c:pt idx="59">
+                  <c:v>90.51</c:v>
+                </c:pt>
+              </c:numCache>
+            </c:numRef>
+          </c:yVal>
+          <c:smooth val="0"/>
+          <c:extLst>
+            <c:ext xmlns:c16="http://schemas.microsoft.com/office/drawing/2014/chart" uri="{C3380CC4-5D6E-409C-BE32-E72D297353CC}">
+              <c16:uniqueId val="{00000002-A68B-4CB4-8153-6AA11D17B178}"/>
+            </c:ext>
+          </c:extLst>
+        </c:ser>
+        <c:ser>
+          <c:idx val="3"/>
+          <c:order val="3"/>
+          <c:tx>
+            <c:strRef>
+              <c:f>'wg32'!$E$1</c:f>
+              <c:strCache>
+                <c:ptCount val="1"/>
+                <c:pt idx="0">
+                  <c:v>p90</c:v>
+                </c:pt>
+              </c:strCache>
+            </c:strRef>
+          </c:tx>
+          <c:spPr>
+            <a:ln w="6350" cap="rnd">
+              <a:solidFill>
+                <a:schemeClr val="accent4"/>
+              </a:solidFill>
+              <a:round/>
+            </a:ln>
+            <a:effectLst/>
+          </c:spPr>
+          <c:marker>
+            <c:symbol val="circle"/>
+            <c:size val="2"/>
+            <c:spPr>
+              <a:solidFill>
+                <a:schemeClr val="accent4"/>
+              </a:solidFill>
+              <a:ln w="9525">
+                <a:noFill/>
+              </a:ln>
+              <a:effectLst/>
+            </c:spPr>
+          </c:marker>
+          <c:xVal>
+            <c:numRef>
+              <c:f>'wg32'!$A$2:$A$61</c:f>
+              <c:numCache>
+                <c:formatCode>General</c:formatCode>
+                <c:ptCount val="60"/>
+                <c:pt idx="0">
+                  <c:v>5</c:v>
+                </c:pt>
+                <c:pt idx="1">
+                  <c:v>10</c:v>
+                </c:pt>
+                <c:pt idx="2">
+                  <c:v>15</c:v>
+                </c:pt>
+                <c:pt idx="3">
+                  <c:v>20</c:v>
+                </c:pt>
+                <c:pt idx="4">
+                  <c:v>25</c:v>
+                </c:pt>
+                <c:pt idx="5">
+                  <c:v>30</c:v>
+                </c:pt>
+                <c:pt idx="6">
+                  <c:v>35</c:v>
+                </c:pt>
+                <c:pt idx="7">
+                  <c:v>40</c:v>
+                </c:pt>
+                <c:pt idx="8">
+                  <c:v>45</c:v>
+                </c:pt>
+                <c:pt idx="9">
+                  <c:v>50</c:v>
+                </c:pt>
+                <c:pt idx="10">
+                  <c:v>55</c:v>
+                </c:pt>
+                <c:pt idx="11">
+                  <c:v>60</c:v>
+                </c:pt>
+                <c:pt idx="12">
+                  <c:v>65</c:v>
+                </c:pt>
+                <c:pt idx="13">
+                  <c:v>70</c:v>
+                </c:pt>
+                <c:pt idx="14">
+                  <c:v>75</c:v>
+                </c:pt>
+                <c:pt idx="15">
+                  <c:v>80</c:v>
+                </c:pt>
+                <c:pt idx="16">
+                  <c:v>85</c:v>
+                </c:pt>
+                <c:pt idx="17">
+                  <c:v>90</c:v>
+                </c:pt>
+                <c:pt idx="18">
+                  <c:v>95</c:v>
+                </c:pt>
+                <c:pt idx="19">
+                  <c:v>100</c:v>
+                </c:pt>
+                <c:pt idx="20">
+                  <c:v>105</c:v>
+                </c:pt>
+                <c:pt idx="21">
+                  <c:v>110</c:v>
+                </c:pt>
+                <c:pt idx="22">
+                  <c:v>115</c:v>
+                </c:pt>
+                <c:pt idx="23">
+                  <c:v>120</c:v>
+                </c:pt>
+                <c:pt idx="24">
+                  <c:v>125</c:v>
+                </c:pt>
+                <c:pt idx="25">
+                  <c:v>130</c:v>
+                </c:pt>
+                <c:pt idx="26">
+                  <c:v>135</c:v>
+                </c:pt>
+                <c:pt idx="27">
+                  <c:v>140</c:v>
+                </c:pt>
+                <c:pt idx="28">
+                  <c:v>145</c:v>
+                </c:pt>
+                <c:pt idx="29">
+                  <c:v>150</c:v>
+                </c:pt>
+                <c:pt idx="30">
+                  <c:v>155</c:v>
+                </c:pt>
+                <c:pt idx="31">
+                  <c:v>160</c:v>
+                </c:pt>
+                <c:pt idx="32">
+                  <c:v>165</c:v>
+                </c:pt>
+                <c:pt idx="33">
+                  <c:v>170</c:v>
+                </c:pt>
+                <c:pt idx="34">
+                  <c:v>175</c:v>
+                </c:pt>
+                <c:pt idx="35">
+                  <c:v>180</c:v>
+                </c:pt>
+                <c:pt idx="36">
+                  <c:v>185</c:v>
+                </c:pt>
+                <c:pt idx="37">
+                  <c:v>190</c:v>
+                </c:pt>
+                <c:pt idx="38">
+                  <c:v>195</c:v>
+                </c:pt>
+                <c:pt idx="39">
+                  <c:v>200</c:v>
+                </c:pt>
+                <c:pt idx="40">
+                  <c:v>205</c:v>
+                </c:pt>
+                <c:pt idx="41">
+                  <c:v>210</c:v>
+                </c:pt>
+                <c:pt idx="42">
+                  <c:v>215</c:v>
+                </c:pt>
+                <c:pt idx="43">
+                  <c:v>220</c:v>
+                </c:pt>
+                <c:pt idx="44">
+                  <c:v>225</c:v>
+                </c:pt>
+                <c:pt idx="45">
+                  <c:v>230</c:v>
+                </c:pt>
+                <c:pt idx="46">
+                  <c:v>235</c:v>
+                </c:pt>
+                <c:pt idx="47">
+                  <c:v>240</c:v>
+                </c:pt>
+                <c:pt idx="48">
+                  <c:v>245</c:v>
+                </c:pt>
+                <c:pt idx="49">
+                  <c:v>250</c:v>
+                </c:pt>
+                <c:pt idx="50">
+                  <c:v>255</c:v>
+                </c:pt>
+                <c:pt idx="51">
+                  <c:v>260</c:v>
+                </c:pt>
+                <c:pt idx="52">
+                  <c:v>265</c:v>
+                </c:pt>
+                <c:pt idx="53">
+                  <c:v>270</c:v>
+                </c:pt>
+                <c:pt idx="54">
+                  <c:v>275</c:v>
+                </c:pt>
+                <c:pt idx="55">
+                  <c:v>280</c:v>
+                </c:pt>
+                <c:pt idx="56">
+                  <c:v>285</c:v>
+                </c:pt>
+                <c:pt idx="57">
+                  <c:v>290</c:v>
+                </c:pt>
+                <c:pt idx="58">
+                  <c:v>295</c:v>
+                </c:pt>
+                <c:pt idx="59">
+                  <c:v>300</c:v>
+                </c:pt>
+              </c:numCache>
+            </c:numRef>
+          </c:xVal>
+          <c:yVal>
+            <c:numRef>
+              <c:f>'wg32'!$E$2:$E$61</c:f>
+              <c:numCache>
+                <c:formatCode>General</c:formatCode>
+                <c:ptCount val="60"/>
+                <c:pt idx="18">
+                  <c:v>89.67</c:v>
+                </c:pt>
+                <c:pt idx="19">
+                  <c:v>90.08</c:v>
+                </c:pt>
+                <c:pt idx="20">
+                  <c:v>90.29</c:v>
+                </c:pt>
+                <c:pt idx="21">
+                  <c:v>90.57</c:v>
+                </c:pt>
+                <c:pt idx="22">
+                  <c:v>90.49</c:v>
+                </c:pt>
+                <c:pt idx="23">
+                  <c:v>90.57</c:v>
+                </c:pt>
+                <c:pt idx="24">
+                  <c:v>90.7</c:v>
+                </c:pt>
+                <c:pt idx="25">
+                  <c:v>90.73</c:v>
+                </c:pt>
+                <c:pt idx="26">
+                  <c:v>90.71</c:v>
+                </c:pt>
+                <c:pt idx="27">
+                  <c:v>90.56</c:v>
+                </c:pt>
+                <c:pt idx="28">
+                  <c:v>90.51</c:v>
+                </c:pt>
+                <c:pt idx="29">
+                  <c:v>90.77</c:v>
+                </c:pt>
+                <c:pt idx="30">
+                  <c:v>90.77</c:v>
+                </c:pt>
+                <c:pt idx="31">
+                  <c:v>90.68</c:v>
+                </c:pt>
+                <c:pt idx="32">
+                  <c:v>90.8</c:v>
+                </c:pt>
+                <c:pt idx="33">
+                  <c:v>90.72</c:v>
+                </c:pt>
+                <c:pt idx="34">
+                  <c:v>90.71</c:v>
+                </c:pt>
+                <c:pt idx="35">
+                  <c:v>90.74</c:v>
+                </c:pt>
+                <c:pt idx="36">
+                  <c:v>90.75</c:v>
+                </c:pt>
+                <c:pt idx="37">
+                  <c:v>90.78</c:v>
+                </c:pt>
+                <c:pt idx="38">
+                  <c:v>90.75</c:v>
+                </c:pt>
+                <c:pt idx="39">
+                  <c:v>90.85</c:v>
+                </c:pt>
+                <c:pt idx="40">
+                  <c:v>90.8</c:v>
+                </c:pt>
+                <c:pt idx="41">
+                  <c:v>90.86</c:v>
+                </c:pt>
+                <c:pt idx="42">
+                  <c:v>90.71</c:v>
+                </c:pt>
+                <c:pt idx="43">
+                  <c:v>90.72</c:v>
+                </c:pt>
+                <c:pt idx="44">
+                  <c:v>90.64</c:v>
+                </c:pt>
+                <c:pt idx="45">
+                  <c:v>90.62</c:v>
+                </c:pt>
+                <c:pt idx="46">
+                  <c:v>90.65</c:v>
+                </c:pt>
+                <c:pt idx="47">
+                  <c:v>90.65</c:v>
+                </c:pt>
+                <c:pt idx="48">
+                  <c:v>90.73</c:v>
+                </c:pt>
+                <c:pt idx="49">
+                  <c:v>90.7</c:v>
+                </c:pt>
+                <c:pt idx="50">
+                  <c:v>90.78</c:v>
+                </c:pt>
+                <c:pt idx="51">
+                  <c:v>90.64</c:v>
+                </c:pt>
+                <c:pt idx="52">
+                  <c:v>90.62</c:v>
+                </c:pt>
+                <c:pt idx="53">
+                  <c:v>90.72</c:v>
+                </c:pt>
+                <c:pt idx="54">
+                  <c:v>90.66</c:v>
+                </c:pt>
+                <c:pt idx="55">
+                  <c:v>90.62</c:v>
+                </c:pt>
+                <c:pt idx="56">
+                  <c:v>90.72</c:v>
+                </c:pt>
+                <c:pt idx="57">
+                  <c:v>90.69</c:v>
+                </c:pt>
+                <c:pt idx="58">
+                  <c:v>90.77</c:v>
+                </c:pt>
+                <c:pt idx="59">
+                  <c:v>90.69</c:v>
+                </c:pt>
+              </c:numCache>
+            </c:numRef>
+          </c:yVal>
+          <c:smooth val="0"/>
+          <c:extLst>
+            <c:ext xmlns:c16="http://schemas.microsoft.com/office/drawing/2014/chart" uri="{C3380CC4-5D6E-409C-BE32-E72D297353CC}">
+              <c16:uniqueId val="{00000003-A68B-4CB4-8153-6AA11D17B178}"/>
+            </c:ext>
+          </c:extLst>
+        </c:ser>
+        <c:ser>
+          <c:idx val="4"/>
+          <c:order val="4"/>
+          <c:tx>
+            <c:strRef>
+              <c:f>'wg32'!$F$1</c:f>
+              <c:strCache>
+                <c:ptCount val="1"/>
+                <c:pt idx="0">
+                  <c:v>p120</c:v>
+                </c:pt>
+              </c:strCache>
+            </c:strRef>
+          </c:tx>
+          <c:spPr>
+            <a:ln w="6350" cap="rnd">
+              <a:solidFill>
+                <a:schemeClr val="accent5"/>
+              </a:solidFill>
+              <a:round/>
+            </a:ln>
+            <a:effectLst/>
+          </c:spPr>
+          <c:marker>
+            <c:symbol val="circle"/>
+            <c:size val="2"/>
+            <c:spPr>
+              <a:solidFill>
+                <a:schemeClr val="accent5"/>
+              </a:solidFill>
+              <a:ln w="9525">
+                <a:noFill/>
+              </a:ln>
+              <a:effectLst/>
+            </c:spPr>
+          </c:marker>
+          <c:xVal>
+            <c:numRef>
+              <c:f>'wg32'!$A$2:$A$61</c:f>
+              <c:numCache>
+                <c:formatCode>General</c:formatCode>
+                <c:ptCount val="60"/>
+                <c:pt idx="0">
+                  <c:v>5</c:v>
+                </c:pt>
+                <c:pt idx="1">
+                  <c:v>10</c:v>
+                </c:pt>
+                <c:pt idx="2">
+                  <c:v>15</c:v>
+                </c:pt>
+                <c:pt idx="3">
+                  <c:v>20</c:v>
+                </c:pt>
+                <c:pt idx="4">
+                  <c:v>25</c:v>
+                </c:pt>
+                <c:pt idx="5">
+                  <c:v>30</c:v>
+                </c:pt>
+                <c:pt idx="6">
+                  <c:v>35</c:v>
+                </c:pt>
+                <c:pt idx="7">
+                  <c:v>40</c:v>
+                </c:pt>
+                <c:pt idx="8">
+                  <c:v>45</c:v>
+                </c:pt>
+                <c:pt idx="9">
+                  <c:v>50</c:v>
+                </c:pt>
+                <c:pt idx="10">
+                  <c:v>55</c:v>
+                </c:pt>
+                <c:pt idx="11">
+                  <c:v>60</c:v>
+                </c:pt>
+                <c:pt idx="12">
+                  <c:v>65</c:v>
+                </c:pt>
+                <c:pt idx="13">
+                  <c:v>70</c:v>
+                </c:pt>
+                <c:pt idx="14">
+                  <c:v>75</c:v>
+                </c:pt>
+                <c:pt idx="15">
+                  <c:v>80</c:v>
+                </c:pt>
+                <c:pt idx="16">
+                  <c:v>85</c:v>
+                </c:pt>
+                <c:pt idx="17">
+                  <c:v>90</c:v>
+                </c:pt>
+                <c:pt idx="18">
+                  <c:v>95</c:v>
+                </c:pt>
+                <c:pt idx="19">
+                  <c:v>100</c:v>
+                </c:pt>
+                <c:pt idx="20">
+                  <c:v>105</c:v>
+                </c:pt>
+                <c:pt idx="21">
+                  <c:v>110</c:v>
+                </c:pt>
+                <c:pt idx="22">
+                  <c:v>115</c:v>
+                </c:pt>
+                <c:pt idx="23">
+                  <c:v>120</c:v>
+                </c:pt>
+                <c:pt idx="24">
+                  <c:v>125</c:v>
+                </c:pt>
+                <c:pt idx="25">
+                  <c:v>130</c:v>
+                </c:pt>
+                <c:pt idx="26">
+                  <c:v>135</c:v>
+                </c:pt>
+                <c:pt idx="27">
+                  <c:v>140</c:v>
+                </c:pt>
+                <c:pt idx="28">
+                  <c:v>145</c:v>
+                </c:pt>
+                <c:pt idx="29">
+                  <c:v>150</c:v>
+                </c:pt>
+                <c:pt idx="30">
+                  <c:v>155</c:v>
+                </c:pt>
+                <c:pt idx="31">
+                  <c:v>160</c:v>
+                </c:pt>
+                <c:pt idx="32">
+                  <c:v>165</c:v>
+                </c:pt>
+                <c:pt idx="33">
+                  <c:v>170</c:v>
+                </c:pt>
+                <c:pt idx="34">
+                  <c:v>175</c:v>
+                </c:pt>
+                <c:pt idx="35">
+                  <c:v>180</c:v>
+                </c:pt>
+                <c:pt idx="36">
+                  <c:v>185</c:v>
+                </c:pt>
+                <c:pt idx="37">
+                  <c:v>190</c:v>
+                </c:pt>
+                <c:pt idx="38">
+                  <c:v>195</c:v>
+                </c:pt>
+                <c:pt idx="39">
+                  <c:v>200</c:v>
+                </c:pt>
+                <c:pt idx="40">
+                  <c:v>205</c:v>
+                </c:pt>
+                <c:pt idx="41">
+                  <c:v>210</c:v>
+                </c:pt>
+                <c:pt idx="42">
+                  <c:v>215</c:v>
+                </c:pt>
+                <c:pt idx="43">
+                  <c:v>220</c:v>
+                </c:pt>
+                <c:pt idx="44">
+                  <c:v>225</c:v>
+                </c:pt>
+                <c:pt idx="45">
+                  <c:v>230</c:v>
+                </c:pt>
+                <c:pt idx="46">
+                  <c:v>235</c:v>
+                </c:pt>
+                <c:pt idx="47">
+                  <c:v>240</c:v>
+                </c:pt>
+                <c:pt idx="48">
+                  <c:v>245</c:v>
+                </c:pt>
+                <c:pt idx="49">
+                  <c:v>250</c:v>
+                </c:pt>
+                <c:pt idx="50">
+                  <c:v>255</c:v>
+                </c:pt>
+                <c:pt idx="51">
+                  <c:v>260</c:v>
+                </c:pt>
+                <c:pt idx="52">
+                  <c:v>265</c:v>
+                </c:pt>
+                <c:pt idx="53">
+                  <c:v>270</c:v>
+                </c:pt>
+                <c:pt idx="54">
+                  <c:v>275</c:v>
+                </c:pt>
+                <c:pt idx="55">
+                  <c:v>280</c:v>
+                </c:pt>
+                <c:pt idx="56">
+                  <c:v>285</c:v>
+                </c:pt>
+                <c:pt idx="57">
+                  <c:v>290</c:v>
+                </c:pt>
+                <c:pt idx="58">
+                  <c:v>295</c:v>
+                </c:pt>
+                <c:pt idx="59">
+                  <c:v>300</c:v>
+                </c:pt>
+              </c:numCache>
+            </c:numRef>
+          </c:xVal>
+          <c:yVal>
+            <c:numRef>
+              <c:f>'wg32'!$F$2:$F$61</c:f>
+              <c:numCache>
+                <c:formatCode>General</c:formatCode>
+                <c:ptCount val="60"/>
+                <c:pt idx="24">
+                  <c:v>88.98</c:v>
+                </c:pt>
+                <c:pt idx="25">
+                  <c:v>89.59</c:v>
+                </c:pt>
+                <c:pt idx="26">
+                  <c:v>90.06</c:v>
+                </c:pt>
+                <c:pt idx="27">
+                  <c:v>90.19</c:v>
+                </c:pt>
+                <c:pt idx="28">
+                  <c:v>90.26</c:v>
+                </c:pt>
+                <c:pt idx="29">
+                  <c:v>90.57</c:v>
+                </c:pt>
+                <c:pt idx="30">
+                  <c:v>90.49</c:v>
+                </c:pt>
+                <c:pt idx="31">
+                  <c:v>90.47</c:v>
+                </c:pt>
+                <c:pt idx="32">
+                  <c:v>90.62</c:v>
+                </c:pt>
+                <c:pt idx="33">
+                  <c:v>90.59</c:v>
+                </c:pt>
+                <c:pt idx="34">
+                  <c:v>90.68</c:v>
+                </c:pt>
+                <c:pt idx="35">
+                  <c:v>90.64</c:v>
+                </c:pt>
+                <c:pt idx="36">
+                  <c:v>90.66</c:v>
+                </c:pt>
+                <c:pt idx="37">
+                  <c:v>90.69</c:v>
+                </c:pt>
+                <c:pt idx="38">
+                  <c:v>90.61</c:v>
+                </c:pt>
+                <c:pt idx="39">
+                  <c:v>90.56</c:v>
+                </c:pt>
+                <c:pt idx="40">
+                  <c:v>90.65</c:v>
+                </c:pt>
+                <c:pt idx="41">
+                  <c:v>90.66</c:v>
+                </c:pt>
+                <c:pt idx="42">
+                  <c:v>90.74</c:v>
+                </c:pt>
+                <c:pt idx="43">
+                  <c:v>90.59</c:v>
+                </c:pt>
+                <c:pt idx="44">
+                  <c:v>90.71</c:v>
+                </c:pt>
+                <c:pt idx="45">
+                  <c:v>90.69</c:v>
+                </c:pt>
+                <c:pt idx="46">
+                  <c:v>90.6</c:v>
+                </c:pt>
+                <c:pt idx="47">
+                  <c:v>90.68</c:v>
+                </c:pt>
+                <c:pt idx="48">
+                  <c:v>90.65</c:v>
+                </c:pt>
+                <c:pt idx="49">
+                  <c:v>90.7</c:v>
+                </c:pt>
+                <c:pt idx="50">
+                  <c:v>90.66</c:v>
+                </c:pt>
+                <c:pt idx="51">
+                  <c:v>90.72</c:v>
+                </c:pt>
+                <c:pt idx="52">
+                  <c:v>90.65</c:v>
+                </c:pt>
+                <c:pt idx="53">
+                  <c:v>90.73</c:v>
+                </c:pt>
+                <c:pt idx="54">
+                  <c:v>90.68</c:v>
+                </c:pt>
+                <c:pt idx="55">
+                  <c:v>90.62</c:v>
+                </c:pt>
+                <c:pt idx="56">
+                  <c:v>90.66</c:v>
+                </c:pt>
+                <c:pt idx="57">
+                  <c:v>90.67</c:v>
+                </c:pt>
+                <c:pt idx="58">
+                  <c:v>90.62</c:v>
+                </c:pt>
+                <c:pt idx="59">
+                  <c:v>90.69</c:v>
+                </c:pt>
+              </c:numCache>
+            </c:numRef>
+          </c:yVal>
+          <c:smooth val="0"/>
+          <c:extLst>
+            <c:ext xmlns:c16="http://schemas.microsoft.com/office/drawing/2014/chart" uri="{C3380CC4-5D6E-409C-BE32-E72D297353CC}">
+              <c16:uniqueId val="{00000004-A68B-4CB4-8153-6AA11D17B178}"/>
+            </c:ext>
+          </c:extLst>
+        </c:ser>
+        <c:ser>
+          <c:idx val="5"/>
+          <c:order val="5"/>
+          <c:tx>
+            <c:strRef>
+              <c:f>'wg32'!$G$1</c:f>
+              <c:strCache>
+                <c:ptCount val="1"/>
+                <c:pt idx="0">
+                  <c:v>p150</c:v>
+                </c:pt>
+              </c:strCache>
+            </c:strRef>
+          </c:tx>
+          <c:spPr>
+            <a:ln w="6350" cap="rnd">
+              <a:solidFill>
+                <a:schemeClr val="accent6"/>
+              </a:solidFill>
+              <a:round/>
+            </a:ln>
+            <a:effectLst/>
+          </c:spPr>
+          <c:marker>
+            <c:symbol val="circle"/>
+            <c:size val="2"/>
+            <c:spPr>
+              <a:solidFill>
+                <a:schemeClr val="accent6"/>
+              </a:solidFill>
+              <a:ln w="9525">
+                <a:noFill/>
+              </a:ln>
+              <a:effectLst/>
+            </c:spPr>
+          </c:marker>
+          <c:xVal>
+            <c:numRef>
+              <c:f>'wg32'!$A$2:$A$61</c:f>
+              <c:numCache>
+                <c:formatCode>General</c:formatCode>
+                <c:ptCount val="60"/>
+                <c:pt idx="0">
+                  <c:v>5</c:v>
+                </c:pt>
+                <c:pt idx="1">
+                  <c:v>10</c:v>
+                </c:pt>
+                <c:pt idx="2">
+                  <c:v>15</c:v>
+                </c:pt>
+                <c:pt idx="3">
+                  <c:v>20</c:v>
+                </c:pt>
+                <c:pt idx="4">
+                  <c:v>25</c:v>
+                </c:pt>
+                <c:pt idx="5">
+                  <c:v>30</c:v>
+                </c:pt>
+                <c:pt idx="6">
+                  <c:v>35</c:v>
+                </c:pt>
+                <c:pt idx="7">
+                  <c:v>40</c:v>
+                </c:pt>
+                <c:pt idx="8">
+                  <c:v>45</c:v>
+                </c:pt>
+                <c:pt idx="9">
+                  <c:v>50</c:v>
+                </c:pt>
+                <c:pt idx="10">
+                  <c:v>55</c:v>
+                </c:pt>
+                <c:pt idx="11">
+                  <c:v>60</c:v>
+                </c:pt>
+                <c:pt idx="12">
+                  <c:v>65</c:v>
+                </c:pt>
+                <c:pt idx="13">
+                  <c:v>70</c:v>
+                </c:pt>
+                <c:pt idx="14">
+                  <c:v>75</c:v>
+                </c:pt>
+                <c:pt idx="15">
+                  <c:v>80</c:v>
+                </c:pt>
+                <c:pt idx="16">
+                  <c:v>85</c:v>
+                </c:pt>
+                <c:pt idx="17">
+                  <c:v>90</c:v>
+                </c:pt>
+                <c:pt idx="18">
+                  <c:v>95</c:v>
+                </c:pt>
+                <c:pt idx="19">
+                  <c:v>100</c:v>
+                </c:pt>
+                <c:pt idx="20">
+                  <c:v>105</c:v>
+                </c:pt>
+                <c:pt idx="21">
+                  <c:v>110</c:v>
+                </c:pt>
+                <c:pt idx="22">
+                  <c:v>115</c:v>
+                </c:pt>
+                <c:pt idx="23">
+                  <c:v>120</c:v>
+                </c:pt>
+                <c:pt idx="24">
+                  <c:v>125</c:v>
+                </c:pt>
+                <c:pt idx="25">
+                  <c:v>130</c:v>
+                </c:pt>
+                <c:pt idx="26">
+                  <c:v>135</c:v>
+                </c:pt>
+                <c:pt idx="27">
+                  <c:v>140</c:v>
+                </c:pt>
+                <c:pt idx="28">
+                  <c:v>145</c:v>
+                </c:pt>
+                <c:pt idx="29">
+                  <c:v>150</c:v>
+                </c:pt>
+                <c:pt idx="30">
+                  <c:v>155</c:v>
+                </c:pt>
+                <c:pt idx="31">
+                  <c:v>160</c:v>
+                </c:pt>
+                <c:pt idx="32">
+                  <c:v>165</c:v>
+                </c:pt>
+                <c:pt idx="33">
+                  <c:v>170</c:v>
+                </c:pt>
+                <c:pt idx="34">
+                  <c:v>175</c:v>
+                </c:pt>
+                <c:pt idx="35">
+                  <c:v>180</c:v>
+                </c:pt>
+                <c:pt idx="36">
+                  <c:v>185</c:v>
+                </c:pt>
+                <c:pt idx="37">
+                  <c:v>190</c:v>
+                </c:pt>
+                <c:pt idx="38">
+                  <c:v>195</c:v>
+                </c:pt>
+                <c:pt idx="39">
+                  <c:v>200</c:v>
+                </c:pt>
+                <c:pt idx="40">
+                  <c:v>205</c:v>
+                </c:pt>
+                <c:pt idx="41">
+                  <c:v>210</c:v>
+                </c:pt>
+                <c:pt idx="42">
+                  <c:v>215</c:v>
+                </c:pt>
+                <c:pt idx="43">
+                  <c:v>220</c:v>
+                </c:pt>
+                <c:pt idx="44">
+                  <c:v>225</c:v>
+                </c:pt>
+                <c:pt idx="45">
+                  <c:v>230</c:v>
+                </c:pt>
+                <c:pt idx="46">
+                  <c:v>235</c:v>
+                </c:pt>
+                <c:pt idx="47">
+                  <c:v>240</c:v>
+                </c:pt>
+                <c:pt idx="48">
+                  <c:v>245</c:v>
+                </c:pt>
+                <c:pt idx="49">
+                  <c:v>250</c:v>
+                </c:pt>
+                <c:pt idx="50">
+                  <c:v>255</c:v>
+                </c:pt>
+                <c:pt idx="51">
+                  <c:v>260</c:v>
+                </c:pt>
+                <c:pt idx="52">
+                  <c:v>265</c:v>
+                </c:pt>
+                <c:pt idx="53">
+                  <c:v>270</c:v>
+                </c:pt>
+                <c:pt idx="54">
+                  <c:v>275</c:v>
+                </c:pt>
+                <c:pt idx="55">
+                  <c:v>280</c:v>
+                </c:pt>
+                <c:pt idx="56">
+                  <c:v>285</c:v>
+                </c:pt>
+                <c:pt idx="57">
+                  <c:v>290</c:v>
+                </c:pt>
+                <c:pt idx="58">
+                  <c:v>295</c:v>
+                </c:pt>
+                <c:pt idx="59">
+                  <c:v>300</c:v>
+                </c:pt>
+              </c:numCache>
+            </c:numRef>
+          </c:xVal>
+          <c:yVal>
+            <c:numRef>
+              <c:f>'wg32'!$G$2:$G$61</c:f>
+              <c:numCache>
+                <c:formatCode>General</c:formatCode>
+                <c:ptCount val="60"/>
+                <c:pt idx="30">
+                  <c:v>87.45</c:v>
+                </c:pt>
+                <c:pt idx="31">
+                  <c:v>88.46</c:v>
+                </c:pt>
+                <c:pt idx="32">
+                  <c:v>89.04</c:v>
+                </c:pt>
+                <c:pt idx="33">
+                  <c:v>89.43</c:v>
+                </c:pt>
+                <c:pt idx="34">
+                  <c:v>89.6</c:v>
+                </c:pt>
+                <c:pt idx="35">
+                  <c:v>89.69</c:v>
+                </c:pt>
+                <c:pt idx="36">
+                  <c:v>89.83</c:v>
+                </c:pt>
+                <c:pt idx="37">
+                  <c:v>89.77</c:v>
+                </c:pt>
+                <c:pt idx="38">
+                  <c:v>89.88</c:v>
+                </c:pt>
+                <c:pt idx="39">
+                  <c:v>90.03</c:v>
+                </c:pt>
+                <c:pt idx="40">
+                  <c:v>90.1</c:v>
+                </c:pt>
+                <c:pt idx="41">
+                  <c:v>90.1</c:v>
+                </c:pt>
+                <c:pt idx="42">
+                  <c:v>90.09</c:v>
+                </c:pt>
+                <c:pt idx="43">
+                  <c:v>90.2</c:v>
+                </c:pt>
+                <c:pt idx="44">
+                  <c:v>90.14</c:v>
+                </c:pt>
+                <c:pt idx="45">
+                  <c:v>90.3</c:v>
+                </c:pt>
+                <c:pt idx="46">
+                  <c:v>90.23</c:v>
+                </c:pt>
+                <c:pt idx="47">
+                  <c:v>90.21</c:v>
+                </c:pt>
+                <c:pt idx="48">
+                  <c:v>90.28</c:v>
+                </c:pt>
+                <c:pt idx="49">
+                  <c:v>90.27</c:v>
+                </c:pt>
+                <c:pt idx="50">
+                  <c:v>90.3</c:v>
+                </c:pt>
+                <c:pt idx="51">
+                  <c:v>90.34</c:v>
+                </c:pt>
+                <c:pt idx="52">
+                  <c:v>90.31</c:v>
+                </c:pt>
+                <c:pt idx="53">
+                  <c:v>90.31</c:v>
+                </c:pt>
+                <c:pt idx="54">
+                  <c:v>90.31</c:v>
+                </c:pt>
+                <c:pt idx="55">
+                  <c:v>90.18</c:v>
+                </c:pt>
+                <c:pt idx="56">
+                  <c:v>90.28</c:v>
+                </c:pt>
+                <c:pt idx="57">
+                  <c:v>90.27</c:v>
+                </c:pt>
+                <c:pt idx="58">
+                  <c:v>90.36</c:v>
+                </c:pt>
+                <c:pt idx="59">
+                  <c:v>90.34</c:v>
+                </c:pt>
+              </c:numCache>
+            </c:numRef>
+          </c:yVal>
+          <c:smooth val="0"/>
+          <c:extLst>
+            <c:ext xmlns:c16="http://schemas.microsoft.com/office/drawing/2014/chart" uri="{C3380CC4-5D6E-409C-BE32-E72D297353CC}">
+              <c16:uniqueId val="{00000005-A68B-4CB4-8153-6AA11D17B178}"/>
+            </c:ext>
+          </c:extLst>
+        </c:ser>
+        <c:ser>
+          <c:idx val="6"/>
+          <c:order val="6"/>
+          <c:tx>
+            <c:strRef>
+              <c:f>'wg32'!$H$1</c:f>
+              <c:strCache>
+                <c:ptCount val="1"/>
+                <c:pt idx="0">
+                  <c:v>p180</c:v>
+                </c:pt>
+              </c:strCache>
+            </c:strRef>
+          </c:tx>
+          <c:spPr>
+            <a:ln w="6350" cap="rnd">
+              <a:solidFill>
+                <a:schemeClr val="accent1">
+                  <a:lumMod val="60000"/>
+                </a:schemeClr>
+              </a:solidFill>
+              <a:round/>
+            </a:ln>
+            <a:effectLst/>
+          </c:spPr>
+          <c:marker>
+            <c:symbol val="circle"/>
+            <c:size val="2"/>
+            <c:spPr>
+              <a:solidFill>
+                <a:schemeClr val="accent1">
+                  <a:lumMod val="60000"/>
+                </a:schemeClr>
+              </a:solidFill>
+              <a:ln w="9525">
+                <a:noFill/>
+              </a:ln>
+              <a:effectLst/>
+            </c:spPr>
+          </c:marker>
+          <c:xVal>
+            <c:numRef>
+              <c:f>'wg32'!$A$2:$A$61</c:f>
+              <c:numCache>
+                <c:formatCode>General</c:formatCode>
+                <c:ptCount val="60"/>
+                <c:pt idx="0">
+                  <c:v>5</c:v>
+                </c:pt>
+                <c:pt idx="1">
+                  <c:v>10</c:v>
+                </c:pt>
+                <c:pt idx="2">
+                  <c:v>15</c:v>
+                </c:pt>
+                <c:pt idx="3">
+                  <c:v>20</c:v>
+                </c:pt>
+                <c:pt idx="4">
+                  <c:v>25</c:v>
+                </c:pt>
+                <c:pt idx="5">
+                  <c:v>30</c:v>
+                </c:pt>
+                <c:pt idx="6">
+                  <c:v>35</c:v>
+                </c:pt>
+                <c:pt idx="7">
+                  <c:v>40</c:v>
+                </c:pt>
+                <c:pt idx="8">
+                  <c:v>45</c:v>
+                </c:pt>
+                <c:pt idx="9">
+                  <c:v>50</c:v>
+                </c:pt>
+                <c:pt idx="10">
+                  <c:v>55</c:v>
+                </c:pt>
+                <c:pt idx="11">
+                  <c:v>60</c:v>
+                </c:pt>
+                <c:pt idx="12">
+                  <c:v>65</c:v>
+                </c:pt>
+                <c:pt idx="13">
+                  <c:v>70</c:v>
+                </c:pt>
+                <c:pt idx="14">
+                  <c:v>75</c:v>
+                </c:pt>
+                <c:pt idx="15">
+                  <c:v>80</c:v>
+                </c:pt>
+                <c:pt idx="16">
+                  <c:v>85</c:v>
+                </c:pt>
+                <c:pt idx="17">
+                  <c:v>90</c:v>
+                </c:pt>
+                <c:pt idx="18">
+                  <c:v>95</c:v>
+                </c:pt>
+                <c:pt idx="19">
+                  <c:v>100</c:v>
+                </c:pt>
+                <c:pt idx="20">
+                  <c:v>105</c:v>
+                </c:pt>
+                <c:pt idx="21">
+                  <c:v>110</c:v>
+                </c:pt>
+                <c:pt idx="22">
+                  <c:v>115</c:v>
+                </c:pt>
+                <c:pt idx="23">
+                  <c:v>120</c:v>
+                </c:pt>
+                <c:pt idx="24">
+                  <c:v>125</c:v>
+                </c:pt>
+                <c:pt idx="25">
+                  <c:v>130</c:v>
+                </c:pt>
+                <c:pt idx="26">
+                  <c:v>135</c:v>
+                </c:pt>
+                <c:pt idx="27">
+                  <c:v>140</c:v>
+                </c:pt>
+                <c:pt idx="28">
+                  <c:v>145</c:v>
+                </c:pt>
+                <c:pt idx="29">
+                  <c:v>150</c:v>
+                </c:pt>
+                <c:pt idx="30">
+                  <c:v>155</c:v>
+                </c:pt>
+                <c:pt idx="31">
+                  <c:v>160</c:v>
+                </c:pt>
+                <c:pt idx="32">
+                  <c:v>165</c:v>
+                </c:pt>
+                <c:pt idx="33">
+                  <c:v>170</c:v>
+                </c:pt>
+                <c:pt idx="34">
+                  <c:v>175</c:v>
+                </c:pt>
+                <c:pt idx="35">
+                  <c:v>180</c:v>
+                </c:pt>
+                <c:pt idx="36">
+                  <c:v>185</c:v>
+                </c:pt>
+                <c:pt idx="37">
+                  <c:v>190</c:v>
+                </c:pt>
+                <c:pt idx="38">
+                  <c:v>195</c:v>
+                </c:pt>
+                <c:pt idx="39">
+                  <c:v>200</c:v>
+                </c:pt>
+                <c:pt idx="40">
+                  <c:v>205</c:v>
+                </c:pt>
+                <c:pt idx="41">
+                  <c:v>210</c:v>
+                </c:pt>
+                <c:pt idx="42">
+                  <c:v>215</c:v>
+                </c:pt>
+                <c:pt idx="43">
+                  <c:v>220</c:v>
+                </c:pt>
+                <c:pt idx="44">
+                  <c:v>225</c:v>
+                </c:pt>
+                <c:pt idx="45">
+                  <c:v>230</c:v>
+                </c:pt>
+                <c:pt idx="46">
+                  <c:v>235</c:v>
+                </c:pt>
+                <c:pt idx="47">
+                  <c:v>240</c:v>
+                </c:pt>
+                <c:pt idx="48">
+                  <c:v>245</c:v>
+                </c:pt>
+                <c:pt idx="49">
+                  <c:v>250</c:v>
+                </c:pt>
+                <c:pt idx="50">
+                  <c:v>255</c:v>
+                </c:pt>
+                <c:pt idx="51">
+                  <c:v>260</c:v>
+                </c:pt>
+                <c:pt idx="52">
+                  <c:v>265</c:v>
+                </c:pt>
+                <c:pt idx="53">
+                  <c:v>270</c:v>
+                </c:pt>
+                <c:pt idx="54">
+                  <c:v>275</c:v>
+                </c:pt>
+                <c:pt idx="55">
+                  <c:v>280</c:v>
+                </c:pt>
+                <c:pt idx="56">
+                  <c:v>285</c:v>
+                </c:pt>
+                <c:pt idx="57">
+                  <c:v>290</c:v>
+                </c:pt>
+                <c:pt idx="58">
+                  <c:v>295</c:v>
+                </c:pt>
+                <c:pt idx="59">
+                  <c:v>300</c:v>
+                </c:pt>
+              </c:numCache>
+            </c:numRef>
+          </c:xVal>
+          <c:yVal>
+            <c:numRef>
+              <c:f>'wg32'!$H$2:$H$61</c:f>
+              <c:numCache>
+                <c:formatCode>General</c:formatCode>
+                <c:ptCount val="60"/>
+                <c:pt idx="36">
+                  <c:v>88.04</c:v>
+                </c:pt>
+                <c:pt idx="37">
+                  <c:v>88.47</c:v>
+                </c:pt>
+                <c:pt idx="38">
+                  <c:v>88.95</c:v>
+                </c:pt>
+                <c:pt idx="39">
+                  <c:v>89.28</c:v>
+                </c:pt>
+                <c:pt idx="40">
+                  <c:v>89.37</c:v>
+                </c:pt>
+                <c:pt idx="41">
+                  <c:v>89.57</c:v>
+                </c:pt>
+                <c:pt idx="42">
+                  <c:v>89.49</c:v>
+                </c:pt>
+                <c:pt idx="43">
+                  <c:v>89.47</c:v>
+                </c:pt>
+                <c:pt idx="44">
+                  <c:v>89.51</c:v>
+                </c:pt>
+                <c:pt idx="45">
+                  <c:v>89.65</c:v>
+                </c:pt>
+                <c:pt idx="46">
+                  <c:v>89.82</c:v>
+                </c:pt>
+                <c:pt idx="47">
+                  <c:v>89.69</c:v>
+                </c:pt>
+                <c:pt idx="48">
+                  <c:v>89.87</c:v>
+                </c:pt>
+                <c:pt idx="49">
+                  <c:v>89.78</c:v>
+                </c:pt>
+                <c:pt idx="50">
+                  <c:v>89.88</c:v>
+                </c:pt>
+                <c:pt idx="51">
+                  <c:v>90</c:v>
+                </c:pt>
+                <c:pt idx="52">
+                  <c:v>89.93</c:v>
+                </c:pt>
+                <c:pt idx="53">
+                  <c:v>89.93</c:v>
+                </c:pt>
+                <c:pt idx="54">
+                  <c:v>89.95</c:v>
+                </c:pt>
+                <c:pt idx="55">
+                  <c:v>89.87</c:v>
+                </c:pt>
+                <c:pt idx="56">
+                  <c:v>89.99</c:v>
+                </c:pt>
+                <c:pt idx="57">
+                  <c:v>89.93</c:v>
+                </c:pt>
+                <c:pt idx="58">
+                  <c:v>89.97</c:v>
+                </c:pt>
+                <c:pt idx="59">
+                  <c:v>89.92</c:v>
+                </c:pt>
+              </c:numCache>
+            </c:numRef>
+          </c:yVal>
+          <c:smooth val="0"/>
+          <c:extLst>
+            <c:ext xmlns:c16="http://schemas.microsoft.com/office/drawing/2014/chart" uri="{C3380CC4-5D6E-409C-BE32-E72D297353CC}">
+              <c16:uniqueId val="{00000006-A68B-4CB4-8153-6AA11D17B178}"/>
+            </c:ext>
+          </c:extLst>
+        </c:ser>
+        <c:ser>
+          <c:idx val="7"/>
+          <c:order val="7"/>
+          <c:tx>
+            <c:strRef>
+              <c:f>'wg32'!$I$1</c:f>
+              <c:strCache>
+                <c:ptCount val="1"/>
+                <c:pt idx="0">
+                  <c:v>p210</c:v>
+                </c:pt>
+              </c:strCache>
+            </c:strRef>
+          </c:tx>
+          <c:spPr>
+            <a:ln w="6350" cap="rnd">
+              <a:solidFill>
+                <a:schemeClr val="accent2">
+                  <a:lumMod val="60000"/>
+                </a:schemeClr>
+              </a:solidFill>
+              <a:round/>
+            </a:ln>
+            <a:effectLst/>
+          </c:spPr>
+          <c:marker>
+            <c:symbol val="circle"/>
+            <c:size val="2"/>
+            <c:spPr>
+              <a:solidFill>
+                <a:schemeClr val="accent2">
+                  <a:lumMod val="60000"/>
+                </a:schemeClr>
+              </a:solidFill>
+              <a:ln w="9525">
+                <a:noFill/>
+              </a:ln>
+              <a:effectLst/>
+            </c:spPr>
+          </c:marker>
+          <c:xVal>
+            <c:numRef>
+              <c:f>'wg32'!$A$2:$A$61</c:f>
+              <c:numCache>
+                <c:formatCode>General</c:formatCode>
+                <c:ptCount val="60"/>
+                <c:pt idx="0">
+                  <c:v>5</c:v>
+                </c:pt>
+                <c:pt idx="1">
+                  <c:v>10</c:v>
+                </c:pt>
+                <c:pt idx="2">
+                  <c:v>15</c:v>
+                </c:pt>
+                <c:pt idx="3">
+                  <c:v>20</c:v>
+                </c:pt>
+                <c:pt idx="4">
+                  <c:v>25</c:v>
+                </c:pt>
+                <c:pt idx="5">
+                  <c:v>30</c:v>
+                </c:pt>
+                <c:pt idx="6">
+                  <c:v>35</c:v>
+                </c:pt>
+                <c:pt idx="7">
+                  <c:v>40</c:v>
+                </c:pt>
+                <c:pt idx="8">
+                  <c:v>45</c:v>
+                </c:pt>
+                <c:pt idx="9">
+                  <c:v>50</c:v>
+                </c:pt>
+                <c:pt idx="10">
+                  <c:v>55</c:v>
+                </c:pt>
+                <c:pt idx="11">
+                  <c:v>60</c:v>
+                </c:pt>
+                <c:pt idx="12">
+                  <c:v>65</c:v>
+                </c:pt>
+                <c:pt idx="13">
+                  <c:v>70</c:v>
+                </c:pt>
+                <c:pt idx="14">
+                  <c:v>75</c:v>
+                </c:pt>
+                <c:pt idx="15">
+                  <c:v>80</c:v>
+                </c:pt>
+                <c:pt idx="16">
+                  <c:v>85</c:v>
+                </c:pt>
+                <c:pt idx="17">
+                  <c:v>90</c:v>
+                </c:pt>
+                <c:pt idx="18">
+                  <c:v>95</c:v>
+                </c:pt>
+                <c:pt idx="19">
+                  <c:v>100</c:v>
+                </c:pt>
+                <c:pt idx="20">
+                  <c:v>105</c:v>
+                </c:pt>
+                <c:pt idx="21">
+                  <c:v>110</c:v>
+                </c:pt>
+                <c:pt idx="22">
+                  <c:v>115</c:v>
+                </c:pt>
+                <c:pt idx="23">
+                  <c:v>120</c:v>
+                </c:pt>
+                <c:pt idx="24">
+                  <c:v>125</c:v>
+                </c:pt>
+                <c:pt idx="25">
+                  <c:v>130</c:v>
+                </c:pt>
+                <c:pt idx="26">
+                  <c:v>135</c:v>
+                </c:pt>
+                <c:pt idx="27">
+                  <c:v>140</c:v>
+                </c:pt>
+                <c:pt idx="28">
+                  <c:v>145</c:v>
+                </c:pt>
+                <c:pt idx="29">
+                  <c:v>150</c:v>
+                </c:pt>
+                <c:pt idx="30">
+                  <c:v>155</c:v>
+                </c:pt>
+                <c:pt idx="31">
+                  <c:v>160</c:v>
+                </c:pt>
+                <c:pt idx="32">
+                  <c:v>165</c:v>
+                </c:pt>
+                <c:pt idx="33">
+                  <c:v>170</c:v>
+                </c:pt>
+                <c:pt idx="34">
+                  <c:v>175</c:v>
+                </c:pt>
+                <c:pt idx="35">
+                  <c:v>180</c:v>
+                </c:pt>
+                <c:pt idx="36">
+                  <c:v>185</c:v>
+                </c:pt>
+                <c:pt idx="37">
+                  <c:v>190</c:v>
+                </c:pt>
+                <c:pt idx="38">
+                  <c:v>195</c:v>
+                </c:pt>
+                <c:pt idx="39">
+                  <c:v>200</c:v>
+                </c:pt>
+                <c:pt idx="40">
+                  <c:v>205</c:v>
+                </c:pt>
+                <c:pt idx="41">
+                  <c:v>210</c:v>
+                </c:pt>
+                <c:pt idx="42">
+                  <c:v>215</c:v>
+                </c:pt>
+                <c:pt idx="43">
+                  <c:v>220</c:v>
+                </c:pt>
+                <c:pt idx="44">
+                  <c:v>225</c:v>
+                </c:pt>
+                <c:pt idx="45">
+                  <c:v>230</c:v>
+                </c:pt>
+                <c:pt idx="46">
+                  <c:v>235</c:v>
+                </c:pt>
+                <c:pt idx="47">
+                  <c:v>240</c:v>
+                </c:pt>
+                <c:pt idx="48">
+                  <c:v>245</c:v>
+                </c:pt>
+                <c:pt idx="49">
+                  <c:v>250</c:v>
+                </c:pt>
+                <c:pt idx="50">
+                  <c:v>255</c:v>
+                </c:pt>
+                <c:pt idx="51">
+                  <c:v>260</c:v>
+                </c:pt>
+                <c:pt idx="52">
+                  <c:v>265</c:v>
+                </c:pt>
+                <c:pt idx="53">
+                  <c:v>270</c:v>
+                </c:pt>
+                <c:pt idx="54">
+                  <c:v>275</c:v>
+                </c:pt>
+                <c:pt idx="55">
+                  <c:v>280</c:v>
+                </c:pt>
+                <c:pt idx="56">
+                  <c:v>285</c:v>
+                </c:pt>
+                <c:pt idx="57">
+                  <c:v>290</c:v>
+                </c:pt>
+                <c:pt idx="58">
+                  <c:v>295</c:v>
+                </c:pt>
+                <c:pt idx="59">
+                  <c:v>300</c:v>
+                </c:pt>
+              </c:numCache>
+            </c:numRef>
+          </c:xVal>
+          <c:yVal>
+            <c:numRef>
+              <c:f>'wg32'!$I$2:$I$61</c:f>
+              <c:numCache>
+                <c:formatCode>General</c:formatCode>
+                <c:ptCount val="60"/>
+                <c:pt idx="42">
+                  <c:v>87.97</c:v>
+                </c:pt>
+                <c:pt idx="43">
+                  <c:v>88.01</c:v>
+                </c:pt>
+                <c:pt idx="44">
+                  <c:v>88.17</c:v>
+                </c:pt>
+                <c:pt idx="45">
+                  <c:v>88.3</c:v>
+                </c:pt>
+                <c:pt idx="46">
+                  <c:v>88.53</c:v>
+                </c:pt>
+                <c:pt idx="47">
+                  <c:v>88.78</c:v>
+                </c:pt>
+                <c:pt idx="48">
+                  <c:v>88.85</c:v>
+                </c:pt>
+                <c:pt idx="49">
+                  <c:v>88.98</c:v>
+                </c:pt>
+                <c:pt idx="50">
+                  <c:v>89.02</c:v>
+                </c:pt>
+                <c:pt idx="51">
+                  <c:v>89.15</c:v>
+                </c:pt>
+                <c:pt idx="52">
+                  <c:v>89.04</c:v>
+                </c:pt>
+                <c:pt idx="53">
+                  <c:v>89.19</c:v>
+                </c:pt>
+                <c:pt idx="54">
+                  <c:v>89.24</c:v>
+                </c:pt>
+                <c:pt idx="55">
+                  <c:v>89.12</c:v>
+                </c:pt>
+                <c:pt idx="56">
+                  <c:v>89.22</c:v>
+                </c:pt>
+                <c:pt idx="57">
+                  <c:v>89.27</c:v>
+                </c:pt>
+                <c:pt idx="58">
+                  <c:v>89.35</c:v>
+                </c:pt>
+                <c:pt idx="59">
+                  <c:v>89.41</c:v>
+                </c:pt>
+              </c:numCache>
+            </c:numRef>
+          </c:yVal>
+          <c:smooth val="0"/>
+          <c:extLst>
+            <c:ext xmlns:c16="http://schemas.microsoft.com/office/drawing/2014/chart" uri="{C3380CC4-5D6E-409C-BE32-E72D297353CC}">
+              <c16:uniqueId val="{00000007-A68B-4CB4-8153-6AA11D17B178}"/>
+            </c:ext>
+          </c:extLst>
+        </c:ser>
+        <c:ser>
+          <c:idx val="8"/>
+          <c:order val="8"/>
+          <c:tx>
+            <c:strRef>
+              <c:f>'wg32'!$J$1</c:f>
+              <c:strCache>
+                <c:ptCount val="1"/>
+                <c:pt idx="0">
+                  <c:v>p240</c:v>
+                </c:pt>
+              </c:strCache>
+            </c:strRef>
+          </c:tx>
+          <c:spPr>
+            <a:ln w="6350" cap="rnd">
+              <a:solidFill>
+                <a:schemeClr val="accent3">
+                  <a:lumMod val="60000"/>
+                </a:schemeClr>
+              </a:solidFill>
+              <a:round/>
+            </a:ln>
+            <a:effectLst/>
+          </c:spPr>
+          <c:marker>
+            <c:symbol val="circle"/>
+            <c:size val="2"/>
+            <c:spPr>
+              <a:solidFill>
+                <a:schemeClr val="accent3">
+                  <a:lumMod val="60000"/>
+                </a:schemeClr>
+              </a:solidFill>
+              <a:ln w="9525">
+                <a:noFill/>
+              </a:ln>
+              <a:effectLst/>
+            </c:spPr>
+          </c:marker>
+          <c:xVal>
+            <c:numRef>
+              <c:f>'wg32'!$A$2:$A$61</c:f>
+              <c:numCache>
+                <c:formatCode>General</c:formatCode>
+                <c:ptCount val="60"/>
+                <c:pt idx="0">
+                  <c:v>5</c:v>
+                </c:pt>
+                <c:pt idx="1">
+                  <c:v>10</c:v>
+                </c:pt>
+                <c:pt idx="2">
+                  <c:v>15</c:v>
+                </c:pt>
+                <c:pt idx="3">
+                  <c:v>20</c:v>
+                </c:pt>
+                <c:pt idx="4">
+                  <c:v>25</c:v>
+                </c:pt>
+                <c:pt idx="5">
+                  <c:v>30</c:v>
+                </c:pt>
+                <c:pt idx="6">
+                  <c:v>35</c:v>
+                </c:pt>
+                <c:pt idx="7">
+                  <c:v>40</c:v>
+                </c:pt>
+                <c:pt idx="8">
+                  <c:v>45</c:v>
+                </c:pt>
+                <c:pt idx="9">
+                  <c:v>50</c:v>
+                </c:pt>
+                <c:pt idx="10">
+                  <c:v>55</c:v>
+                </c:pt>
+                <c:pt idx="11">
+                  <c:v>60</c:v>
+                </c:pt>
+                <c:pt idx="12">
+                  <c:v>65</c:v>
+                </c:pt>
+                <c:pt idx="13">
+                  <c:v>70</c:v>
+                </c:pt>
+                <c:pt idx="14">
+                  <c:v>75</c:v>
+                </c:pt>
+                <c:pt idx="15">
+                  <c:v>80</c:v>
+                </c:pt>
+                <c:pt idx="16">
+                  <c:v>85</c:v>
+                </c:pt>
+                <c:pt idx="17">
+                  <c:v>90</c:v>
+                </c:pt>
+                <c:pt idx="18">
+                  <c:v>95</c:v>
+                </c:pt>
+                <c:pt idx="19">
+                  <c:v>100</c:v>
+                </c:pt>
+                <c:pt idx="20">
+                  <c:v>105</c:v>
+                </c:pt>
+                <c:pt idx="21">
+                  <c:v>110</c:v>
+                </c:pt>
+                <c:pt idx="22">
+                  <c:v>115</c:v>
+                </c:pt>
+                <c:pt idx="23">
+                  <c:v>120</c:v>
+                </c:pt>
+                <c:pt idx="24">
+                  <c:v>125</c:v>
+                </c:pt>
+                <c:pt idx="25">
+                  <c:v>130</c:v>
+                </c:pt>
+                <c:pt idx="26">
+                  <c:v>135</c:v>
+                </c:pt>
+                <c:pt idx="27">
+                  <c:v>140</c:v>
+                </c:pt>
+                <c:pt idx="28">
+                  <c:v>145</c:v>
+                </c:pt>
+                <c:pt idx="29">
+                  <c:v>150</c:v>
+                </c:pt>
+                <c:pt idx="30">
+                  <c:v>155</c:v>
+                </c:pt>
+                <c:pt idx="31">
+                  <c:v>160</c:v>
+                </c:pt>
+                <c:pt idx="32">
+                  <c:v>165</c:v>
+                </c:pt>
+                <c:pt idx="33">
+                  <c:v>170</c:v>
+                </c:pt>
+                <c:pt idx="34">
+                  <c:v>175</c:v>
+                </c:pt>
+                <c:pt idx="35">
+                  <c:v>180</c:v>
+                </c:pt>
+                <c:pt idx="36">
+                  <c:v>185</c:v>
+                </c:pt>
+                <c:pt idx="37">
+                  <c:v>190</c:v>
+                </c:pt>
+                <c:pt idx="38">
+                  <c:v>195</c:v>
+                </c:pt>
+                <c:pt idx="39">
+                  <c:v>200</c:v>
+                </c:pt>
+                <c:pt idx="40">
+                  <c:v>205</c:v>
+                </c:pt>
+                <c:pt idx="41">
+                  <c:v>210</c:v>
+                </c:pt>
+                <c:pt idx="42">
+                  <c:v>215</c:v>
+                </c:pt>
+                <c:pt idx="43">
+                  <c:v>220</c:v>
+                </c:pt>
+                <c:pt idx="44">
+                  <c:v>225</c:v>
+                </c:pt>
+                <c:pt idx="45">
+                  <c:v>230</c:v>
+                </c:pt>
+                <c:pt idx="46">
+                  <c:v>235</c:v>
+                </c:pt>
+                <c:pt idx="47">
+                  <c:v>240</c:v>
+                </c:pt>
+                <c:pt idx="48">
+                  <c:v>245</c:v>
+                </c:pt>
+                <c:pt idx="49">
+                  <c:v>250</c:v>
+                </c:pt>
+                <c:pt idx="50">
+                  <c:v>255</c:v>
+                </c:pt>
+                <c:pt idx="51">
+                  <c:v>260</c:v>
+                </c:pt>
+                <c:pt idx="52">
+                  <c:v>265</c:v>
+                </c:pt>
+                <c:pt idx="53">
+                  <c:v>270</c:v>
+                </c:pt>
+                <c:pt idx="54">
+                  <c:v>275</c:v>
+                </c:pt>
+                <c:pt idx="55">
+                  <c:v>280</c:v>
+                </c:pt>
+                <c:pt idx="56">
+                  <c:v>285</c:v>
+                </c:pt>
+                <c:pt idx="57">
+                  <c:v>290</c:v>
+                </c:pt>
+                <c:pt idx="58">
+                  <c:v>295</c:v>
+                </c:pt>
+                <c:pt idx="59">
+                  <c:v>300</c:v>
+                </c:pt>
+              </c:numCache>
+            </c:numRef>
+          </c:xVal>
+          <c:yVal>
+            <c:numRef>
+              <c:f>'wg32'!$J$2:$J$61</c:f>
+              <c:numCache>
+                <c:formatCode>General</c:formatCode>
+                <c:ptCount val="60"/>
+                <c:pt idx="48">
+                  <c:v>87.67</c:v>
+                </c:pt>
+                <c:pt idx="49">
+                  <c:v>87.78</c:v>
+                </c:pt>
+                <c:pt idx="50">
+                  <c:v>87.86</c:v>
+                </c:pt>
+                <c:pt idx="51">
+                  <c:v>87.98</c:v>
+                </c:pt>
+                <c:pt idx="52">
+                  <c:v>87.99</c:v>
+                </c:pt>
+                <c:pt idx="53">
+                  <c:v>88.1</c:v>
+                </c:pt>
+                <c:pt idx="54">
+                  <c:v>88.17</c:v>
+                </c:pt>
+                <c:pt idx="55">
+                  <c:v>88.21</c:v>
+                </c:pt>
+                <c:pt idx="56">
+                  <c:v>88.28</c:v>
+                </c:pt>
+                <c:pt idx="57">
+                  <c:v>88.36</c:v>
+                </c:pt>
+                <c:pt idx="58">
+                  <c:v>88.38</c:v>
+                </c:pt>
+                <c:pt idx="59">
+                  <c:v>88.35</c:v>
+                </c:pt>
+              </c:numCache>
+            </c:numRef>
+          </c:yVal>
+          <c:smooth val="0"/>
+          <c:extLst>
+            <c:ext xmlns:c16="http://schemas.microsoft.com/office/drawing/2014/chart" uri="{C3380CC4-5D6E-409C-BE32-E72D297353CC}">
+              <c16:uniqueId val="{00000008-A68B-4CB4-8153-6AA11D17B178}"/>
+            </c:ext>
+          </c:extLst>
+        </c:ser>
+        <c:dLbls>
+          <c:showLegendKey val="0"/>
+          <c:showVal val="0"/>
+          <c:showCatName val="0"/>
+          <c:showSerName val="0"/>
+          <c:showPercent val="0"/>
+          <c:showBubbleSize val="0"/>
+        </c:dLbls>
+        <c:axId val="269356895"/>
+        <c:axId val="58358527"/>
+      </c:scatterChart>
+      <c:valAx>
+        <c:axId val="269356895"/>
+        <c:scaling>
+          <c:orientation val="minMax"/>
+          <c:max val="300"/>
+        </c:scaling>
+        <c:delete val="0"/>
+        <c:axPos val="b"/>
+        <c:majorGridlines>
+          <c:spPr>
+            <a:ln w="9525" cap="flat" cmpd="sng" algn="ctr">
+              <a:solidFill>
+                <a:schemeClr val="tx1">
+                  <a:lumMod val="15000"/>
+                  <a:lumOff val="85000"/>
+                </a:schemeClr>
+              </a:solidFill>
+              <a:round/>
+            </a:ln>
+            <a:effectLst/>
+          </c:spPr>
+        </c:majorGridlines>
+        <c:title>
+          <c:tx>
+            <c:rich>
+              <a:bodyPr rot="0" spcFirstLastPara="1" vertOverflow="ellipsis" vert="horz" wrap="square" anchor="ctr" anchorCtr="1"/>
+              <a:lstStyle/>
+              <a:p>
+                <a:pPr>
+                  <a:defRPr sz="600" b="0" i="0" u="none" strike="noStrike" kern="1200" baseline="0">
+                    <a:solidFill>
+                      <a:schemeClr val="tx1">
+                        <a:lumMod val="65000"/>
+                        <a:lumOff val="35000"/>
+                      </a:schemeClr>
+                    </a:solidFill>
+                    <a:latin typeface="+mn-lt"/>
+                    <a:ea typeface="+mn-ea"/>
+                    <a:cs typeface="+mn-cs"/>
+                  </a:defRPr>
+                </a:pPr>
+                <a:r>
+                  <a:rPr lang="en-US" altLang="zh-CN" dirty="0" smtClean="0"/>
+                  <a:t>epoch</a:t>
+                </a:r>
+                <a:endParaRPr lang="zh-CN" altLang="en-US" dirty="0"/>
+              </a:p>
+            </c:rich>
+          </c:tx>
+          <c:layout/>
+          <c:overlay val="0"/>
+          <c:spPr>
+            <a:noFill/>
+            <a:ln>
+              <a:noFill/>
+            </a:ln>
+            <a:effectLst/>
+          </c:spPr>
+          <c:txPr>
+            <a:bodyPr rot="0" spcFirstLastPara="1" vertOverflow="ellipsis" vert="horz" wrap="square" anchor="ctr" anchorCtr="1"/>
+            <a:lstStyle/>
+            <a:p>
+              <a:pPr>
+                <a:defRPr sz="600" b="0" i="0" u="none" strike="noStrike" kern="1200" baseline="0">
+                  <a:solidFill>
+                    <a:schemeClr val="tx1">
+                      <a:lumMod val="65000"/>
+                      <a:lumOff val="35000"/>
+                    </a:schemeClr>
+                  </a:solidFill>
+                  <a:latin typeface="+mn-lt"/>
+                  <a:ea typeface="+mn-ea"/>
+                  <a:cs typeface="+mn-cs"/>
+                </a:defRPr>
+              </a:pPr>
+              <a:endParaRPr lang="zh-CN"/>
+            </a:p>
+          </c:txPr>
+        </c:title>
+        <c:numFmt formatCode="General" sourceLinked="1"/>
+        <c:majorTickMark val="none"/>
+        <c:minorTickMark val="none"/>
+        <c:tickLblPos val="nextTo"/>
+        <c:spPr>
+          <a:noFill/>
+          <a:ln w="9525" cap="flat" cmpd="sng" algn="ctr">
+            <a:solidFill>
+              <a:schemeClr val="tx1">
+                <a:lumMod val="25000"/>
+                <a:lumOff val="75000"/>
+              </a:schemeClr>
+            </a:solidFill>
+            <a:round/>
+          </a:ln>
+          <a:effectLst/>
+        </c:spPr>
+        <c:txPr>
+          <a:bodyPr rot="-60000000" spcFirstLastPara="1" vertOverflow="ellipsis" vert="horz" wrap="square" anchor="ctr" anchorCtr="1"/>
+          <a:lstStyle/>
+          <a:p>
+            <a:pPr>
+              <a:defRPr sz="600" b="0" i="0" u="none" strike="noStrike" kern="1200" baseline="0">
+                <a:solidFill>
+                  <a:schemeClr val="tx1">
+                    <a:lumMod val="65000"/>
+                    <a:lumOff val="35000"/>
+                  </a:schemeClr>
+                </a:solidFill>
+                <a:latin typeface="+mn-lt"/>
+                <a:ea typeface="+mn-ea"/>
+                <a:cs typeface="+mn-cs"/>
+              </a:defRPr>
+            </a:pPr>
+            <a:endParaRPr lang="zh-CN"/>
+          </a:p>
+        </c:txPr>
+        <c:crossAx val="58358527"/>
+        <c:crosses val="autoZero"/>
+        <c:crossBetween val="midCat"/>
+      </c:valAx>
+      <c:valAx>
+        <c:axId val="58358527"/>
+        <c:scaling>
+          <c:orientation val="minMax"/>
+          <c:max val="95"/>
+          <c:min val="75"/>
+        </c:scaling>
+        <c:delete val="0"/>
+        <c:axPos val="l"/>
+        <c:majorGridlines>
+          <c:spPr>
+            <a:ln w="9525" cap="flat" cmpd="sng" algn="ctr">
+              <a:solidFill>
+                <a:schemeClr val="tx1">
+                  <a:lumMod val="15000"/>
+                  <a:lumOff val="85000"/>
+                </a:schemeClr>
+              </a:solidFill>
+              <a:round/>
+            </a:ln>
+            <a:effectLst/>
+          </c:spPr>
+        </c:majorGridlines>
+        <c:title>
+          <c:tx>
+            <c:rich>
+              <a:bodyPr rot="-5400000" spcFirstLastPara="1" vertOverflow="ellipsis" vert="horz" wrap="square" anchor="ctr" anchorCtr="1"/>
+              <a:lstStyle/>
+              <a:p>
+                <a:pPr>
+                  <a:defRPr sz="600" b="0" i="0" u="none" strike="noStrike" kern="1200" baseline="0">
+                    <a:solidFill>
+                      <a:schemeClr val="tx1">
+                        <a:lumMod val="65000"/>
+                        <a:lumOff val="35000"/>
+                      </a:schemeClr>
+                    </a:solidFill>
+                    <a:latin typeface="+mn-lt"/>
+                    <a:ea typeface="+mn-ea"/>
+                    <a:cs typeface="+mn-cs"/>
+                  </a:defRPr>
+                </a:pPr>
+                <a:r>
+                  <a:rPr lang="en-US" altLang="zh-CN" dirty="0" smtClean="0"/>
+                  <a:t>Top-1 Accuracy (%)</a:t>
+                </a:r>
+                <a:endParaRPr lang="zh-CN" altLang="en-US" dirty="0"/>
+              </a:p>
+            </c:rich>
+          </c:tx>
+          <c:layout/>
+          <c:overlay val="0"/>
+          <c:spPr>
+            <a:noFill/>
+            <a:ln>
+              <a:noFill/>
+            </a:ln>
+            <a:effectLst/>
+          </c:spPr>
+          <c:txPr>
+            <a:bodyPr rot="-5400000" spcFirstLastPara="1" vertOverflow="ellipsis" vert="horz" wrap="square" anchor="ctr" anchorCtr="1"/>
+            <a:lstStyle/>
+            <a:p>
+              <a:pPr>
+                <a:defRPr sz="600" b="0" i="0" u="none" strike="noStrike" kern="1200" baseline="0">
+                  <a:solidFill>
+                    <a:schemeClr val="tx1">
+                      <a:lumMod val="65000"/>
+                      <a:lumOff val="35000"/>
+                    </a:schemeClr>
+                  </a:solidFill>
+                  <a:latin typeface="+mn-lt"/>
+                  <a:ea typeface="+mn-ea"/>
+                  <a:cs typeface="+mn-cs"/>
+                </a:defRPr>
+              </a:pPr>
+              <a:endParaRPr lang="zh-CN"/>
+            </a:p>
+          </c:txPr>
+        </c:title>
+        <c:numFmt formatCode="General" sourceLinked="1"/>
+        <c:majorTickMark val="none"/>
+        <c:minorTickMark val="none"/>
+        <c:tickLblPos val="nextTo"/>
+        <c:spPr>
+          <a:noFill/>
+          <a:ln w="9525" cap="flat" cmpd="sng" algn="ctr">
+            <a:solidFill>
+              <a:schemeClr val="tx1">
+                <a:lumMod val="25000"/>
+                <a:lumOff val="75000"/>
+              </a:schemeClr>
+            </a:solidFill>
+            <a:round/>
+          </a:ln>
+          <a:effectLst/>
+        </c:spPr>
+        <c:txPr>
+          <a:bodyPr rot="-60000000" spcFirstLastPara="1" vertOverflow="ellipsis" vert="horz" wrap="square" anchor="ctr" anchorCtr="1"/>
+          <a:lstStyle/>
+          <a:p>
+            <a:pPr>
+              <a:defRPr sz="600" b="0" i="0" u="none" strike="noStrike" kern="1200" baseline="0">
+                <a:solidFill>
+                  <a:schemeClr val="tx1">
+                    <a:lumMod val="65000"/>
+                    <a:lumOff val="35000"/>
+                  </a:schemeClr>
+                </a:solidFill>
+                <a:latin typeface="+mn-lt"/>
+                <a:ea typeface="+mn-ea"/>
+                <a:cs typeface="+mn-cs"/>
+              </a:defRPr>
+            </a:pPr>
+            <a:endParaRPr lang="zh-CN"/>
+          </a:p>
+        </c:txPr>
+        <c:crossAx val="269356895"/>
+        <c:crosses val="autoZero"/>
+        <c:crossBetween val="midCat"/>
+        <c:majorUnit val="5"/>
+      </c:valAx>
+      <c:spPr>
+        <a:noFill/>
+        <a:ln>
+          <a:noFill/>
+        </a:ln>
+        <a:effectLst/>
+      </c:spPr>
+    </c:plotArea>
+    <c:plotVisOnly val="1"/>
+    <c:dispBlanksAs val="gap"/>
+    <c:showDLblsOverMax val="0"/>
+  </c:chart>
+  <c:spPr>
+    <a:noFill/>
+    <a:ln>
+      <a:noFill/>
+    </a:ln>
+    <a:effectLst/>
+  </c:spPr>
+  <c:txPr>
+    <a:bodyPr/>
+    <a:lstStyle/>
+    <a:p>
+      <a:pPr>
+        <a:defRPr sz="600"/>
+      </a:pPr>
+      <a:endParaRPr lang="zh-CN"/>
+    </a:p>
+  </c:txPr>
+  <c:externalData r:id="rId3">
+    <c:autoUpdate val="0"/>
+  </c:externalData>
+</c:chartSpace>
+</file>
+
+<file path=ppt/charts/chart2.xml><?xml version="1.0" encoding="utf-8"?>
 <c:chartSpace xmlns:c="http://schemas.openxmlformats.org/drawingml/2006/chart" xmlns:a="http://schemas.openxmlformats.org/drawingml/2006/main" xmlns:r="http://schemas.openxmlformats.org/officeDocument/2006/relationships" xmlns:c16r2="http://schemas.microsoft.com/office/drawing/2015/06/chart">
   <c:date1904 val="0"/>
   <c:lang val="zh-CN"/>
@@ -3523,7 +6948,7 @@
 </c:chartSpace>
 </file>
 
-<file path=ppt/charts/chart2.xml><?xml version="1.0" encoding="utf-8"?>
+<file path=ppt/charts/chart3.xml><?xml version="1.0" encoding="utf-8"?>
 <c:chartSpace xmlns:c="http://schemas.openxmlformats.org/drawingml/2006/chart" xmlns:a="http://schemas.openxmlformats.org/drawingml/2006/main" xmlns:r="http://schemas.openxmlformats.org/officeDocument/2006/relationships" xmlns:c16r2="http://schemas.microsoft.com/office/drawing/2015/06/chart">
   <c:date1904 val="0"/>
   <c:lang val="zh-CN"/>
@@ -6974,6 +10399,46 @@
 </file>
 
 <file path=ppt/charts/colors2.xml><?xml version="1.0" encoding="utf-8"?>
+<cs:colorStyle xmlns:cs="http://schemas.microsoft.com/office/drawing/2012/chartStyle" xmlns:a="http://schemas.openxmlformats.org/drawingml/2006/main" meth="cycle" id="10">
+  <a:schemeClr val="accent1"/>
+  <a:schemeClr val="accent2"/>
+  <a:schemeClr val="accent3"/>
+  <a:schemeClr val="accent4"/>
+  <a:schemeClr val="accent5"/>
+  <a:schemeClr val="accent6"/>
+  <cs:variation/>
+  <cs:variation>
+    <a:lumMod val="60000"/>
+  </cs:variation>
+  <cs:variation>
+    <a:lumMod val="80000"/>
+    <a:lumOff val="20000"/>
+  </cs:variation>
+  <cs:variation>
+    <a:lumMod val="80000"/>
+  </cs:variation>
+  <cs:variation>
+    <a:lumMod val="60000"/>
+    <a:lumOff val="40000"/>
+  </cs:variation>
+  <cs:variation>
+    <a:lumMod val="50000"/>
+  </cs:variation>
+  <cs:variation>
+    <a:lumMod val="70000"/>
+    <a:lumOff val="30000"/>
+  </cs:variation>
+  <cs:variation>
+    <a:lumMod val="70000"/>
+  </cs:variation>
+  <cs:variation>
+    <a:lumMod val="50000"/>
+    <a:lumOff val="50000"/>
+  </cs:variation>
+</cs:colorStyle>
+</file>
+
+<file path=ppt/charts/colors3.xml><?xml version="1.0" encoding="utf-8"?>
 <cs:colorStyle xmlns:cs="http://schemas.microsoft.com/office/drawing/2012/chartStyle" xmlns:a="http://schemas.openxmlformats.org/drawingml/2006/main" meth="cycle" id="10">
   <a:schemeClr val="accent1"/>
   <a:schemeClr val="accent2"/>
@@ -8045,6 +11510,522 @@
 </cs:chartStyle>
 </file>
 
+<file path=ppt/charts/style3.xml><?xml version="1.0" encoding="utf-8"?>
+<cs:chartStyle xmlns:cs="http://schemas.microsoft.com/office/drawing/2012/chartStyle" xmlns:a="http://schemas.openxmlformats.org/drawingml/2006/main" id="240">
+  <cs:axisTitle>
+    <cs:lnRef idx="0"/>
+    <cs:fillRef idx="0"/>
+    <cs:effectRef idx="0"/>
+    <cs:fontRef idx="minor">
+      <a:schemeClr val="tx1">
+        <a:lumMod val="65000"/>
+        <a:lumOff val="35000"/>
+      </a:schemeClr>
+    </cs:fontRef>
+    <cs:defRPr sz="1000" kern="1200"/>
+  </cs:axisTitle>
+  <cs:categoryAxis>
+    <cs:lnRef idx="0"/>
+    <cs:fillRef idx="0"/>
+    <cs:effectRef idx="0"/>
+    <cs:fontRef idx="minor">
+      <a:schemeClr val="tx1">
+        <a:lumMod val="65000"/>
+        <a:lumOff val="35000"/>
+      </a:schemeClr>
+    </cs:fontRef>
+    <cs:spPr>
+      <a:ln w="9525" cap="flat" cmpd="sng" algn="ctr">
+        <a:solidFill>
+          <a:schemeClr val="tx1">
+            <a:lumMod val="25000"/>
+            <a:lumOff val="75000"/>
+          </a:schemeClr>
+        </a:solidFill>
+        <a:round/>
+      </a:ln>
+    </cs:spPr>
+    <cs:defRPr sz="900" kern="1200"/>
+  </cs:categoryAxis>
+  <cs:chartArea mods="allowNoFillOverride allowNoLineOverride">
+    <cs:lnRef idx="0"/>
+    <cs:fillRef idx="0"/>
+    <cs:effectRef idx="0"/>
+    <cs:fontRef idx="minor">
+      <a:schemeClr val="tx1"/>
+    </cs:fontRef>
+    <cs:spPr>
+      <a:solidFill>
+        <a:schemeClr val="bg1"/>
+      </a:solidFill>
+      <a:ln w="9525" cap="flat" cmpd="sng" algn="ctr">
+        <a:solidFill>
+          <a:schemeClr val="tx1">
+            <a:lumMod val="15000"/>
+            <a:lumOff val="85000"/>
+          </a:schemeClr>
+        </a:solidFill>
+        <a:round/>
+      </a:ln>
+    </cs:spPr>
+    <cs:defRPr sz="1000" kern="1200"/>
+  </cs:chartArea>
+  <cs:dataLabel>
+    <cs:lnRef idx="0"/>
+    <cs:fillRef idx="0"/>
+    <cs:effectRef idx="0"/>
+    <cs:fontRef idx="minor">
+      <a:schemeClr val="tx1">
+        <a:lumMod val="75000"/>
+        <a:lumOff val="25000"/>
+      </a:schemeClr>
+    </cs:fontRef>
+    <cs:defRPr sz="900" kern="1200"/>
+  </cs:dataLabel>
+  <cs:dataLabelCallout>
+    <cs:lnRef idx="0"/>
+    <cs:fillRef idx="0"/>
+    <cs:effectRef idx="0"/>
+    <cs:fontRef idx="minor">
+      <a:schemeClr val="dk1">
+        <a:lumMod val="65000"/>
+        <a:lumOff val="35000"/>
+      </a:schemeClr>
+    </cs:fontRef>
+    <cs:spPr>
+      <a:solidFill>
+        <a:schemeClr val="lt1"/>
+      </a:solidFill>
+      <a:ln>
+        <a:solidFill>
+          <a:schemeClr val="dk1">
+            <a:lumMod val="25000"/>
+            <a:lumOff val="75000"/>
+          </a:schemeClr>
+        </a:solidFill>
+      </a:ln>
+    </cs:spPr>
+    <cs:defRPr sz="900" kern="1200"/>
+    <cs:bodyPr rot="0" spcFirstLastPara="1" vertOverflow="clip" horzOverflow="clip" vert="horz" wrap="square" lIns="36576" tIns="18288" rIns="36576" bIns="18288" anchor="ctr" anchorCtr="1">
+      <a:spAutoFit/>
+    </cs:bodyPr>
+  </cs:dataLabelCallout>
+  <cs:dataPoint>
+    <cs:lnRef idx="0"/>
+    <cs:fillRef idx="1">
+      <cs:styleClr val="auto"/>
+    </cs:fillRef>
+    <cs:effectRef idx="0"/>
+    <cs:fontRef idx="minor">
+      <a:schemeClr val="tx1"/>
+    </cs:fontRef>
+  </cs:dataPoint>
+  <cs:dataPoint3D>
+    <cs:lnRef idx="0"/>
+    <cs:fillRef idx="1">
+      <cs:styleClr val="auto"/>
+    </cs:fillRef>
+    <cs:effectRef idx="0"/>
+    <cs:fontRef idx="minor">
+      <a:schemeClr val="tx1"/>
+    </cs:fontRef>
+  </cs:dataPoint3D>
+  <cs:dataPointLine>
+    <cs:lnRef idx="0">
+      <cs:styleClr val="auto"/>
+    </cs:lnRef>
+    <cs:fillRef idx="1"/>
+    <cs:effectRef idx="0"/>
+    <cs:fontRef idx="minor">
+      <a:schemeClr val="tx1"/>
+    </cs:fontRef>
+    <cs:spPr>
+      <a:ln w="19050" cap="rnd">
+        <a:solidFill>
+          <a:schemeClr val="phClr"/>
+        </a:solidFill>
+        <a:round/>
+      </a:ln>
+    </cs:spPr>
+  </cs:dataPointLine>
+  <cs:dataPointMarker>
+    <cs:lnRef idx="0">
+      <cs:styleClr val="auto"/>
+    </cs:lnRef>
+    <cs:fillRef idx="1">
+      <cs:styleClr val="auto"/>
+    </cs:fillRef>
+    <cs:effectRef idx="0"/>
+    <cs:fontRef idx="minor">
+      <a:schemeClr val="tx1"/>
+    </cs:fontRef>
+    <cs:spPr>
+      <a:ln w="9525">
+        <a:solidFill>
+          <a:schemeClr val="phClr"/>
+        </a:solidFill>
+      </a:ln>
+    </cs:spPr>
+  </cs:dataPointMarker>
+  <cs:dataPointMarkerLayout symbol="circle" size="5"/>
+  <cs:dataPointWireframe>
+    <cs:lnRef idx="0">
+      <cs:styleClr val="auto"/>
+    </cs:lnRef>
+    <cs:fillRef idx="0"/>
+    <cs:effectRef idx="0"/>
+    <cs:fontRef idx="minor">
+      <a:schemeClr val="dk1"/>
+    </cs:fontRef>
+    <cs:spPr>
+      <a:ln w="9525" cap="rnd">
+        <a:solidFill>
+          <a:schemeClr val="phClr"/>
+        </a:solidFill>
+        <a:round/>
+      </a:ln>
+    </cs:spPr>
+  </cs:dataPointWireframe>
+  <cs:dataTable>
+    <cs:lnRef idx="0"/>
+    <cs:fillRef idx="0"/>
+    <cs:effectRef idx="0"/>
+    <cs:fontRef idx="minor">
+      <a:schemeClr val="tx1">
+        <a:lumMod val="65000"/>
+        <a:lumOff val="35000"/>
+      </a:schemeClr>
+    </cs:fontRef>
+    <cs:spPr>
+      <a:noFill/>
+      <a:ln w="9525" cap="flat" cmpd="sng" algn="ctr">
+        <a:solidFill>
+          <a:schemeClr val="tx1">
+            <a:lumMod val="15000"/>
+            <a:lumOff val="85000"/>
+          </a:schemeClr>
+        </a:solidFill>
+        <a:round/>
+      </a:ln>
+    </cs:spPr>
+    <cs:defRPr sz="900" kern="1200"/>
+  </cs:dataTable>
+  <cs:downBar>
+    <cs:lnRef idx="0"/>
+    <cs:fillRef idx="0"/>
+    <cs:effectRef idx="0"/>
+    <cs:fontRef idx="minor">
+      <a:schemeClr val="tx1"/>
+    </cs:fontRef>
+    <cs:spPr>
+      <a:solidFill>
+        <a:schemeClr val="dk1">
+          <a:lumMod val="75000"/>
+          <a:lumOff val="25000"/>
+        </a:schemeClr>
+      </a:solidFill>
+      <a:ln w="9525" cap="flat" cmpd="sng" algn="ctr">
+        <a:solidFill>
+          <a:schemeClr val="tx1">
+            <a:lumMod val="65000"/>
+            <a:lumOff val="35000"/>
+          </a:schemeClr>
+        </a:solidFill>
+        <a:round/>
+      </a:ln>
+    </cs:spPr>
+  </cs:downBar>
+  <cs:dropLine>
+    <cs:lnRef idx="0"/>
+    <cs:fillRef idx="0"/>
+    <cs:effectRef idx="0"/>
+    <cs:fontRef idx="minor">
+      <a:schemeClr val="tx1"/>
+    </cs:fontRef>
+    <cs:spPr>
+      <a:ln w="9525" cap="flat" cmpd="sng" algn="ctr">
+        <a:solidFill>
+          <a:schemeClr val="tx1">
+            <a:lumMod val="35000"/>
+            <a:lumOff val="65000"/>
+          </a:schemeClr>
+        </a:solidFill>
+        <a:round/>
+      </a:ln>
+    </cs:spPr>
+  </cs:dropLine>
+  <cs:errorBar>
+    <cs:lnRef idx="0"/>
+    <cs:fillRef idx="0"/>
+    <cs:effectRef idx="0"/>
+    <cs:fontRef idx="minor">
+      <a:schemeClr val="tx1"/>
+    </cs:fontRef>
+    <cs:spPr>
+      <a:ln w="9525" cap="flat" cmpd="sng" algn="ctr">
+        <a:solidFill>
+          <a:schemeClr val="tx1">
+            <a:lumMod val="65000"/>
+            <a:lumOff val="35000"/>
+          </a:schemeClr>
+        </a:solidFill>
+        <a:round/>
+      </a:ln>
+    </cs:spPr>
+  </cs:errorBar>
+  <cs:floor>
+    <cs:lnRef idx="0"/>
+    <cs:fillRef idx="0"/>
+    <cs:effectRef idx="0"/>
+    <cs:fontRef idx="minor">
+      <a:schemeClr val="tx1"/>
+    </cs:fontRef>
+    <cs:spPr>
+      <a:noFill/>
+      <a:ln>
+        <a:noFill/>
+      </a:ln>
+    </cs:spPr>
+  </cs:floor>
+  <cs:gridlineMajor>
+    <cs:lnRef idx="0"/>
+    <cs:fillRef idx="0"/>
+    <cs:effectRef idx="0"/>
+    <cs:fontRef idx="minor">
+      <a:schemeClr val="tx1"/>
+    </cs:fontRef>
+    <cs:spPr>
+      <a:ln w="9525" cap="flat" cmpd="sng" algn="ctr">
+        <a:solidFill>
+          <a:schemeClr val="tx1">
+            <a:lumMod val="15000"/>
+            <a:lumOff val="85000"/>
+          </a:schemeClr>
+        </a:solidFill>
+        <a:round/>
+      </a:ln>
+    </cs:spPr>
+  </cs:gridlineMajor>
+  <cs:gridlineMinor>
+    <cs:lnRef idx="0"/>
+    <cs:fillRef idx="0"/>
+    <cs:effectRef idx="0"/>
+    <cs:fontRef idx="minor">
+      <a:schemeClr val="tx1"/>
+    </cs:fontRef>
+    <cs:spPr>
+      <a:ln w="9525" cap="flat" cmpd="sng" algn="ctr">
+        <a:solidFill>
+          <a:schemeClr val="tx1">
+            <a:lumMod val="5000"/>
+            <a:lumOff val="95000"/>
+          </a:schemeClr>
+        </a:solidFill>
+        <a:round/>
+      </a:ln>
+    </cs:spPr>
+  </cs:gridlineMinor>
+  <cs:hiLoLine>
+    <cs:lnRef idx="0"/>
+    <cs:fillRef idx="0"/>
+    <cs:effectRef idx="0"/>
+    <cs:fontRef idx="minor">
+      <a:schemeClr val="tx1"/>
+    </cs:fontRef>
+    <cs:spPr>
+      <a:ln w="9525" cap="flat" cmpd="sng" algn="ctr">
+        <a:solidFill>
+          <a:schemeClr val="tx1">
+            <a:lumMod val="50000"/>
+            <a:lumOff val="50000"/>
+          </a:schemeClr>
+        </a:solidFill>
+        <a:round/>
+      </a:ln>
+    </cs:spPr>
+  </cs:hiLoLine>
+  <cs:leaderLine>
+    <cs:lnRef idx="0"/>
+    <cs:fillRef idx="0"/>
+    <cs:effectRef idx="0"/>
+    <cs:fontRef idx="minor">
+      <a:schemeClr val="tx1"/>
+    </cs:fontRef>
+    <cs:spPr>
+      <a:ln w="9525" cap="flat" cmpd="sng" algn="ctr">
+        <a:solidFill>
+          <a:schemeClr val="tx1">
+            <a:lumMod val="35000"/>
+            <a:lumOff val="65000"/>
+          </a:schemeClr>
+        </a:solidFill>
+        <a:round/>
+      </a:ln>
+    </cs:spPr>
+  </cs:leaderLine>
+  <cs:legend>
+    <cs:lnRef idx="0"/>
+    <cs:fillRef idx="0"/>
+    <cs:effectRef idx="0"/>
+    <cs:fontRef idx="minor">
+      <a:schemeClr val="tx1">
+        <a:lumMod val="65000"/>
+        <a:lumOff val="35000"/>
+      </a:schemeClr>
+    </cs:fontRef>
+    <cs:defRPr sz="900" kern="1200"/>
+  </cs:legend>
+  <cs:plotArea mods="allowNoFillOverride allowNoLineOverride">
+    <cs:lnRef idx="0"/>
+    <cs:fillRef idx="0"/>
+    <cs:effectRef idx="0"/>
+    <cs:fontRef idx="minor">
+      <a:schemeClr val="tx1"/>
+    </cs:fontRef>
+  </cs:plotArea>
+  <cs:plotArea3D mods="allowNoFillOverride allowNoLineOverride">
+    <cs:lnRef idx="0"/>
+    <cs:fillRef idx="0"/>
+    <cs:effectRef idx="0"/>
+    <cs:fontRef idx="minor">
+      <a:schemeClr val="tx1"/>
+    </cs:fontRef>
+  </cs:plotArea3D>
+  <cs:seriesAxis>
+    <cs:lnRef idx="0"/>
+    <cs:fillRef idx="0"/>
+    <cs:effectRef idx="0"/>
+    <cs:fontRef idx="minor">
+      <a:schemeClr val="tx1">
+        <a:lumMod val="65000"/>
+        <a:lumOff val="35000"/>
+      </a:schemeClr>
+    </cs:fontRef>
+    <cs:defRPr sz="900" kern="1200"/>
+  </cs:seriesAxis>
+  <cs:seriesLine>
+    <cs:lnRef idx="0"/>
+    <cs:fillRef idx="0"/>
+    <cs:effectRef idx="0"/>
+    <cs:fontRef idx="minor">
+      <a:schemeClr val="tx1"/>
+    </cs:fontRef>
+    <cs:spPr>
+      <a:ln w="9525" cap="flat" cmpd="sng" algn="ctr">
+        <a:solidFill>
+          <a:schemeClr val="tx1">
+            <a:lumMod val="35000"/>
+            <a:lumOff val="65000"/>
+          </a:schemeClr>
+        </a:solidFill>
+        <a:round/>
+      </a:ln>
+    </cs:spPr>
+  </cs:seriesLine>
+  <cs:title>
+    <cs:lnRef idx="0"/>
+    <cs:fillRef idx="0"/>
+    <cs:effectRef idx="0"/>
+    <cs:fontRef idx="minor">
+      <a:schemeClr val="tx1">
+        <a:lumMod val="65000"/>
+        <a:lumOff val="35000"/>
+      </a:schemeClr>
+    </cs:fontRef>
+    <cs:defRPr sz="1400" b="0" kern="1200" spc="0" baseline="0"/>
+  </cs:title>
+  <cs:trendline>
+    <cs:lnRef idx="0">
+      <cs:styleClr val="auto"/>
+    </cs:lnRef>
+    <cs:fillRef idx="0"/>
+    <cs:effectRef idx="0"/>
+    <cs:fontRef idx="minor">
+      <a:schemeClr val="tx1"/>
+    </cs:fontRef>
+    <cs:spPr>
+      <a:ln w="19050" cap="rnd">
+        <a:solidFill>
+          <a:schemeClr val="phClr"/>
+        </a:solidFill>
+        <a:prstDash val="sysDot"/>
+      </a:ln>
+    </cs:spPr>
+  </cs:trendline>
+  <cs:trendlineLabel>
+    <cs:lnRef idx="0"/>
+    <cs:fillRef idx="0"/>
+    <cs:effectRef idx="0"/>
+    <cs:fontRef idx="minor">
+      <a:schemeClr val="tx1">
+        <a:lumMod val="65000"/>
+        <a:lumOff val="35000"/>
+      </a:schemeClr>
+    </cs:fontRef>
+    <cs:defRPr sz="900" kern="1200"/>
+  </cs:trendlineLabel>
+  <cs:upBar>
+    <cs:lnRef idx="0"/>
+    <cs:fillRef idx="0"/>
+    <cs:effectRef idx="0"/>
+    <cs:fontRef idx="minor">
+      <a:schemeClr val="tx1"/>
+    </cs:fontRef>
+    <cs:spPr>
+      <a:solidFill>
+        <a:schemeClr val="lt1"/>
+      </a:solidFill>
+      <a:ln w="9525" cap="flat" cmpd="sng" algn="ctr">
+        <a:solidFill>
+          <a:schemeClr val="tx1">
+            <a:lumMod val="65000"/>
+            <a:lumOff val="35000"/>
+          </a:schemeClr>
+        </a:solidFill>
+        <a:round/>
+      </a:ln>
+    </cs:spPr>
+  </cs:upBar>
+  <cs:valueAxis>
+    <cs:lnRef idx="0"/>
+    <cs:fillRef idx="0"/>
+    <cs:effectRef idx="0"/>
+    <cs:fontRef idx="minor">
+      <a:schemeClr val="tx1">
+        <a:lumMod val="65000"/>
+        <a:lumOff val="35000"/>
+      </a:schemeClr>
+    </cs:fontRef>
+    <cs:spPr>
+      <a:ln w="9525" cap="flat" cmpd="sng" algn="ctr">
+        <a:solidFill>
+          <a:schemeClr val="tx1">
+            <a:lumMod val="25000"/>
+            <a:lumOff val="75000"/>
+          </a:schemeClr>
+        </a:solidFill>
+        <a:round/>
+      </a:ln>
+    </cs:spPr>
+    <cs:defRPr sz="900" kern="1200"/>
+  </cs:valueAxis>
+  <cs:wall>
+    <cs:lnRef idx="0"/>
+    <cs:fillRef idx="0"/>
+    <cs:effectRef idx="0"/>
+    <cs:fontRef idx="minor">
+      <a:schemeClr val="tx1"/>
+    </cs:fontRef>
+    <cs:spPr>
+      <a:noFill/>
+      <a:ln>
+        <a:noFill/>
+      </a:ln>
+    </cs:spPr>
+  </cs:wall>
+</cs:chartStyle>
+</file>
+
 <file path=ppt/slideLayouts/slideLayout1.xml><?xml version="1.0" encoding="utf-8"?>
 <p:sldLayout xmlns:a="http://schemas.openxmlformats.org/drawingml/2006/main" xmlns:r="http://schemas.openxmlformats.org/officeDocument/2006/relationships" xmlns:p="http://schemas.openxmlformats.org/presentationml/2006/main" type="title" preserve="1">
   <p:cSld name="标题幻灯片">
@@ -8176,7 +12157,7 @@
           <a:p>
             <a:fld id="{29ECB265-18A1-4B44-AB36-1A05960C5FFF}" type="datetimeFigureOut">
               <a:rPr lang="zh-CN" altLang="en-US" smtClean="0"/>
-              <a:t>2018/9/30</a:t>
+              <a:t>2018/10/1</a:t>
             </a:fld>
             <a:endParaRPr lang="zh-CN" altLang="en-US"/>
           </a:p>
@@ -8346,7 +12327,7 @@
           <a:p>
             <a:fld id="{29ECB265-18A1-4B44-AB36-1A05960C5FFF}" type="datetimeFigureOut">
               <a:rPr lang="zh-CN" altLang="en-US" smtClean="0"/>
-              <a:t>2018/9/30</a:t>
+              <a:t>2018/10/1</a:t>
             </a:fld>
             <a:endParaRPr lang="zh-CN" altLang="en-US"/>
           </a:p>
@@ -8526,7 +12507,7 @@
           <a:p>
             <a:fld id="{29ECB265-18A1-4B44-AB36-1A05960C5FFF}" type="datetimeFigureOut">
               <a:rPr lang="zh-CN" altLang="en-US" smtClean="0"/>
-              <a:t>2018/9/30</a:t>
+              <a:t>2018/10/1</a:t>
             </a:fld>
             <a:endParaRPr lang="zh-CN" altLang="en-US"/>
           </a:p>
@@ -8696,7 +12677,7 @@
           <a:p>
             <a:fld id="{29ECB265-18A1-4B44-AB36-1A05960C5FFF}" type="datetimeFigureOut">
               <a:rPr lang="zh-CN" altLang="en-US" smtClean="0"/>
-              <a:t>2018/9/30</a:t>
+              <a:t>2018/10/1</a:t>
             </a:fld>
             <a:endParaRPr lang="zh-CN" altLang="en-US"/>
           </a:p>
@@ -8940,7 +12921,7 @@
           <a:p>
             <a:fld id="{29ECB265-18A1-4B44-AB36-1A05960C5FFF}" type="datetimeFigureOut">
               <a:rPr lang="zh-CN" altLang="en-US" smtClean="0"/>
-              <a:t>2018/9/30</a:t>
+              <a:t>2018/10/1</a:t>
             </a:fld>
             <a:endParaRPr lang="zh-CN" altLang="en-US"/>
           </a:p>
@@ -9172,7 +13153,7 @@
           <a:p>
             <a:fld id="{29ECB265-18A1-4B44-AB36-1A05960C5FFF}" type="datetimeFigureOut">
               <a:rPr lang="zh-CN" altLang="en-US" smtClean="0"/>
-              <a:t>2018/9/30</a:t>
+              <a:t>2018/10/1</a:t>
             </a:fld>
             <a:endParaRPr lang="zh-CN" altLang="en-US"/>
           </a:p>
@@ -9539,7 +13520,7 @@
           <a:p>
             <a:fld id="{29ECB265-18A1-4B44-AB36-1A05960C5FFF}" type="datetimeFigureOut">
               <a:rPr lang="zh-CN" altLang="en-US" smtClean="0"/>
-              <a:t>2018/9/30</a:t>
+              <a:t>2018/10/1</a:t>
             </a:fld>
             <a:endParaRPr lang="zh-CN" altLang="en-US"/>
           </a:p>
@@ -9657,7 +13638,7 @@
           <a:p>
             <a:fld id="{29ECB265-18A1-4B44-AB36-1A05960C5FFF}" type="datetimeFigureOut">
               <a:rPr lang="zh-CN" altLang="en-US" smtClean="0"/>
-              <a:t>2018/9/30</a:t>
+              <a:t>2018/10/1</a:t>
             </a:fld>
             <a:endParaRPr lang="zh-CN" altLang="en-US"/>
           </a:p>
@@ -9752,7 +13733,7 @@
           <a:p>
             <a:fld id="{29ECB265-18A1-4B44-AB36-1A05960C5FFF}" type="datetimeFigureOut">
               <a:rPr lang="zh-CN" altLang="en-US" smtClean="0"/>
-              <a:t>2018/9/30</a:t>
+              <a:t>2018/10/1</a:t>
             </a:fld>
             <a:endParaRPr lang="zh-CN" altLang="en-US"/>
           </a:p>
@@ -10029,7 +14010,7 @@
           <a:p>
             <a:fld id="{29ECB265-18A1-4B44-AB36-1A05960C5FFF}" type="datetimeFigureOut">
               <a:rPr lang="zh-CN" altLang="en-US" smtClean="0"/>
-              <a:t>2018/9/30</a:t>
+              <a:t>2018/10/1</a:t>
             </a:fld>
             <a:endParaRPr lang="zh-CN" altLang="en-US"/>
           </a:p>
@@ -10286,7 +14267,7 @@
           <a:p>
             <a:fld id="{29ECB265-18A1-4B44-AB36-1A05960C5FFF}" type="datetimeFigureOut">
               <a:rPr lang="zh-CN" altLang="en-US" smtClean="0"/>
-              <a:t>2018/9/30</a:t>
+              <a:t>2018/10/1</a:t>
             </a:fld>
             <a:endParaRPr lang="zh-CN" altLang="en-US"/>
           </a:p>
@@ -10499,7 +14480,7 @@
           <a:p>
             <a:fld id="{29ECB265-18A1-4B44-AB36-1A05960C5FFF}" type="datetimeFigureOut">
               <a:rPr lang="zh-CN" altLang="en-US" smtClean="0"/>
-              <a:t>2018/9/30</a:t>
+              <a:t>2018/10/1</a:t>
             </a:fld>
             <a:endParaRPr lang="zh-CN" altLang="en-US"/>
           </a:p>
@@ -11121,52 +15102,30 @@
           <a:chExt cx="0" cy="0"/>
         </a:xfrm>
       </p:grpSpPr>
-      <p:sp>
-        <p:nvSpPr>
-          <p:cNvPr id="45" name="矩形 44"/>
-          <p:cNvSpPr/>
-          <p:nvPr/>
-        </p:nvSpPr>
-        <p:spPr>
-          <a:xfrm>
-            <a:off x="672353" y="1422804"/>
-            <a:ext cx="6432176" cy="1817937"/>
-          </a:xfrm>
-          <a:prstGeom prst="rect">
-            <a:avLst/>
-          </a:prstGeom>
-          <a:solidFill>
-            <a:schemeClr val="bg1"/>
-          </a:solidFill>
-          <a:ln>
-            <a:noFill/>
-          </a:ln>
-        </p:spPr>
-        <p:style>
-          <a:lnRef idx="2">
-            <a:schemeClr val="accent1">
-              <a:shade val="50000"/>
-            </a:schemeClr>
-          </a:lnRef>
-          <a:fillRef idx="1">
-            <a:schemeClr val="accent1"/>
-          </a:fillRef>
-          <a:effectRef idx="0">
-            <a:schemeClr val="accent1"/>
-          </a:effectRef>
-          <a:fontRef idx="minor">
-            <a:schemeClr val="lt1"/>
-          </a:fontRef>
-        </p:style>
-        <p:txBody>
-          <a:bodyPr rtlCol="0" anchor="ctr"/>
-          <a:lstStyle/>
-          <a:p>
-            <a:pPr algn="ctr"/>
-            <a:endParaRPr lang="zh-CN" altLang="en-US"/>
-          </a:p>
-        </p:txBody>
-      </p:sp>
+      <p:graphicFrame>
+        <p:nvGraphicFramePr>
+          <p:cNvPr id="46" name="图表 45"/>
+          <p:cNvGraphicFramePr>
+            <a:graphicFrameLocks/>
+          </p:cNvGraphicFramePr>
+          <p:nvPr>
+            <p:extLst>
+              <p:ext uri="{D42A27DB-BD31-4B8C-83A1-F6EECF244321}">
+                <p14:modId xmlns:p14="http://schemas.microsoft.com/office/powerpoint/2010/main" val="3194030411"/>
+              </p:ext>
+            </p:extLst>
+          </p:nvPr>
+        </p:nvGraphicFramePr>
+        <p:xfrm>
+          <a:off x="543710" y="1434774"/>
+          <a:ext cx="2356962" cy="1410063"/>
+        </p:xfrm>
+        <a:graphic>
+          <a:graphicData uri="http://schemas.openxmlformats.org/drawingml/2006/chart">
+            <c:chart xmlns:c="http://schemas.openxmlformats.org/drawingml/2006/chart" xmlns:r="http://schemas.openxmlformats.org/officeDocument/2006/relationships" r:id="rId2"/>
+          </a:graphicData>
+        </a:graphic>
+      </p:graphicFrame>
       <p:graphicFrame>
         <p:nvGraphicFramePr>
           <p:cNvPr id="3" name="图表 2"/>
@@ -11176,18 +15135,18 @@
           <p:nvPr>
             <p:extLst>
               <p:ext uri="{D42A27DB-BD31-4B8C-83A1-F6EECF244321}">
-                <p14:modId xmlns:p14="http://schemas.microsoft.com/office/powerpoint/2010/main" val="1515032684"/>
+                <p14:modId xmlns:p14="http://schemas.microsoft.com/office/powerpoint/2010/main" val="2437772411"/>
               </p:ext>
             </p:extLst>
           </p:nvPr>
         </p:nvGraphicFramePr>
         <p:xfrm>
-          <a:off x="942778" y="1560242"/>
-          <a:ext cx="2963341" cy="1772833"/>
+          <a:off x="2680184" y="1434774"/>
+          <a:ext cx="2356962" cy="1410064"/>
         </p:xfrm>
         <a:graphic>
           <a:graphicData uri="http://schemas.openxmlformats.org/drawingml/2006/chart">
-            <c:chart xmlns:c="http://schemas.openxmlformats.org/drawingml/2006/chart" xmlns:r="http://schemas.openxmlformats.org/officeDocument/2006/relationships" r:id="rId2"/>
+            <c:chart xmlns:c="http://schemas.openxmlformats.org/drawingml/2006/chart" xmlns:r="http://schemas.openxmlformats.org/officeDocument/2006/relationships" r:id="rId3"/>
           </a:graphicData>
         </a:graphic>
       </p:graphicFrame>
@@ -11200,18 +15159,18 @@
           <p:nvPr>
             <p:extLst>
               <p:ext uri="{D42A27DB-BD31-4B8C-83A1-F6EECF244321}">
-                <p14:modId xmlns:p14="http://schemas.microsoft.com/office/powerpoint/2010/main" val="409408653"/>
+                <p14:modId xmlns:p14="http://schemas.microsoft.com/office/powerpoint/2010/main" val="1859132645"/>
               </p:ext>
             </p:extLst>
           </p:nvPr>
         </p:nvGraphicFramePr>
         <p:xfrm>
-          <a:off x="3730190" y="1560243"/>
-          <a:ext cx="2963341" cy="1772832"/>
+          <a:off x="4875606" y="1434774"/>
+          <a:ext cx="2356962" cy="1410063"/>
         </p:xfrm>
         <a:graphic>
           <a:graphicData uri="http://schemas.openxmlformats.org/drawingml/2006/chart">
-            <c:chart xmlns:c="http://schemas.openxmlformats.org/drawingml/2006/chart" xmlns:r="http://schemas.openxmlformats.org/officeDocument/2006/relationships" r:id="rId3"/>
+            <c:chart xmlns:c="http://schemas.openxmlformats.org/drawingml/2006/chart" xmlns:r="http://schemas.openxmlformats.org/officeDocument/2006/relationships" r:id="rId4"/>
           </a:graphicData>
         </a:graphic>
       </p:graphicFrame>
@@ -11223,7 +15182,7 @@
         </p:nvGrpSpPr>
         <p:grpSpPr>
           <a:xfrm>
-            <a:off x="1362255" y="3240741"/>
+            <a:off x="1341296" y="2734106"/>
             <a:ext cx="5225156" cy="92334"/>
             <a:chOff x="805543" y="3482522"/>
             <a:chExt cx="5225156" cy="92334"/>
@@ -11954,8 +15913,8 @@
         </p:nvSpPr>
         <p:spPr>
           <a:xfrm>
-            <a:off x="3549806" y="1890038"/>
-            <a:ext cx="220722" cy="220722"/>
+            <a:off x="2579233" y="1716515"/>
+            <a:ext cx="180332" cy="180332"/>
           </a:xfrm>
           <a:prstGeom prst="ellipse">
             <a:avLst/>
@@ -11994,51 +15953,14 @@
       </p:sp>
       <p:cxnSp>
         <p:nvCxnSpPr>
-          <p:cNvPr id="51" name="直接连接符 50"/>
-          <p:cNvCxnSpPr>
-            <a:stCxn id="47" idx="1"/>
-          </p:cNvCxnSpPr>
-          <p:nvPr/>
-        </p:nvCxnSpPr>
-        <p:spPr>
-          <a:xfrm flipH="1" flipV="1">
-            <a:off x="3484783" y="1818346"/>
-            <a:ext cx="97347" cy="104016"/>
-          </a:xfrm>
-          <a:prstGeom prst="line">
-            <a:avLst/>
-          </a:prstGeom>
-          <a:ln w="12700">
-            <a:solidFill>
-              <a:srgbClr val="C00000"/>
-            </a:solidFill>
-          </a:ln>
-        </p:spPr>
-        <p:style>
-          <a:lnRef idx="1">
-            <a:schemeClr val="accent1"/>
-          </a:lnRef>
-          <a:fillRef idx="0">
-            <a:schemeClr val="accent1"/>
-          </a:fillRef>
-          <a:effectRef idx="0">
-            <a:schemeClr val="accent1"/>
-          </a:effectRef>
-          <a:fontRef idx="minor">
-            <a:schemeClr val="tx1"/>
-          </a:fontRef>
-        </p:style>
-      </p:cxnSp>
-      <p:cxnSp>
-        <p:nvCxnSpPr>
           <p:cNvPr id="53" name="直接连接符 52"/>
           <p:cNvCxnSpPr/>
           <p:nvPr/>
         </p:nvCxnSpPr>
         <p:spPr>
           <a:xfrm flipH="1">
-            <a:off x="3283893" y="1820766"/>
-            <a:ext cx="204354" cy="0"/>
+            <a:off x="2546178" y="1896847"/>
+            <a:ext cx="95006" cy="106551"/>
           </a:xfrm>
           <a:prstGeom prst="line">
             <a:avLst/>
@@ -12072,8 +15994,8 @@
         </p:nvSpPr>
         <p:spPr>
           <a:xfrm>
-            <a:off x="1863546" y="1754117"/>
-            <a:ext cx="1393010" cy="123111"/>
+            <a:off x="1503638" y="2003398"/>
+            <a:ext cx="1043555" cy="92333"/>
           </a:xfrm>
           <a:prstGeom prst="rect">
             <a:avLst/>
@@ -12089,10 +16011,10 @@
           <a:lstStyle/>
           <a:p>
             <a:r>
-              <a:rPr lang="en-US" altLang="zh-CN" sz="800" dirty="0" smtClean="0"/>
+              <a:rPr lang="en-US" altLang="zh-CN" sz="600" dirty="0" smtClean="0"/>
               <a:t>valid training, but accuracy varies</a:t>
             </a:r>
-            <a:endParaRPr lang="zh-CN" altLang="en-US" sz="800" dirty="0"/>
+            <a:endParaRPr lang="zh-CN" altLang="en-US" sz="600" dirty="0"/>
           </a:p>
         </p:txBody>
       </p:sp>
@@ -12104,8 +16026,8 @@
         </p:nvSpPr>
         <p:spPr>
           <a:xfrm>
-            <a:off x="2672122" y="2238527"/>
-            <a:ext cx="623569" cy="123111"/>
+            <a:off x="3984215" y="1957231"/>
+            <a:ext cx="464871" cy="92333"/>
           </a:xfrm>
           <a:prstGeom prst="rect">
             <a:avLst/>
@@ -12121,10 +16043,10 @@
           <a:lstStyle/>
           <a:p>
             <a:r>
-              <a:rPr lang="en-US" altLang="zh-CN" sz="800" dirty="0" smtClean="0"/>
+              <a:rPr lang="en-US" altLang="zh-CN" sz="600" dirty="0" smtClean="0"/>
               <a:t>invalid training</a:t>
             </a:r>
-            <a:endParaRPr lang="zh-CN" altLang="en-US" sz="800" dirty="0"/>
+            <a:endParaRPr lang="zh-CN" altLang="en-US" sz="600" dirty="0"/>
           </a:p>
         </p:txBody>
       </p:sp>
@@ -12136,8 +16058,8 @@
         </p:nvCxnSpPr>
         <p:spPr>
           <a:xfrm flipH="1">
-            <a:off x="3476580" y="2161548"/>
-            <a:ext cx="114531" cy="153958"/>
+            <a:off x="4623812" y="1888130"/>
+            <a:ext cx="85750" cy="115268"/>
           </a:xfrm>
           <a:prstGeom prst="line">
             <a:avLst/>
@@ -12171,7 +16093,7 @@
         </p:nvCxnSpPr>
         <p:spPr>
           <a:xfrm flipH="1">
-            <a:off x="3324410" y="2308779"/>
+            <a:off x="4467472" y="2003398"/>
             <a:ext cx="160373" cy="0"/>
           </a:xfrm>
           <a:prstGeom prst="line">
@@ -12206,8 +16128,8 @@
         </p:nvCxnSpPr>
         <p:spPr>
           <a:xfrm>
-            <a:off x="5127240" y="1709834"/>
-            <a:ext cx="0" cy="1154230"/>
+            <a:off x="5996640" y="1592792"/>
+            <a:ext cx="0" cy="823042"/>
           </a:xfrm>
           <a:prstGeom prst="line">
             <a:avLst/>
@@ -12241,8 +16163,8 @@
         </p:nvCxnSpPr>
         <p:spPr>
           <a:xfrm>
-            <a:off x="5126547" y="1815672"/>
-            <a:ext cx="190500" cy="0"/>
+            <a:off x="6011746" y="1669663"/>
+            <a:ext cx="111115" cy="0"/>
           </a:xfrm>
           <a:prstGeom prst="straightConnector1">
             <a:avLst/>
@@ -12277,8 +16199,8 @@
         </p:nvSpPr>
         <p:spPr>
           <a:xfrm>
-            <a:off x="5339574" y="1754117"/>
-            <a:ext cx="1530868" cy="123111"/>
+            <a:off x="6144835" y="1620003"/>
+            <a:ext cx="602729" cy="92333"/>
           </a:xfrm>
           <a:prstGeom prst="rect">
             <a:avLst/>
@@ -12294,10 +16216,14 @@
           <a:lstStyle/>
           <a:p>
             <a:r>
-              <a:rPr lang="en-US" altLang="zh-CN" sz="800" dirty="0" smtClean="0"/>
-              <a:t>gradient underflow from 120 epochs</a:t>
+              <a:rPr lang="en-US" altLang="zh-CN" sz="600" dirty="0" smtClean="0"/>
+              <a:t>gradient </a:t>
             </a:r>
-            <a:endParaRPr lang="zh-CN" altLang="en-US" sz="800" dirty="0"/>
+            <a:r>
+              <a:rPr lang="en-US" altLang="zh-CN" sz="600" dirty="0" smtClean="0"/>
+              <a:t>underflow</a:t>
+            </a:r>
+            <a:endParaRPr lang="zh-CN" altLang="en-US" sz="600" dirty="0"/>
           </a:p>
         </p:txBody>
       </p:sp>
@@ -12309,7 +16235,7 @@
         </p:nvSpPr>
         <p:spPr>
           <a:xfrm>
-            <a:off x="2038765" y="1494390"/>
+            <a:off x="3443158" y="1377348"/>
             <a:ext cx="1021433" cy="215444"/>
           </a:xfrm>
           <a:prstGeom prst="rect">
@@ -12339,7 +16265,7 @@
         </p:nvSpPr>
         <p:spPr>
           <a:xfrm>
-            <a:off x="4860683" y="1494390"/>
+            <a:off x="5775429" y="1377348"/>
             <a:ext cx="1021433" cy="215444"/>
           </a:xfrm>
           <a:prstGeom prst="rect">
@@ -12356,6 +16282,40 @@
             <a:r>
               <a:rPr lang="en-US" altLang="zh-CN" sz="800" dirty="0" smtClean="0"/>
               <a:t>16-bit weight buffer</a:t>
+            </a:r>
+            <a:endParaRPr lang="zh-CN" altLang="en-US" sz="800" dirty="0"/>
+          </a:p>
+        </p:txBody>
+      </p:sp>
+      <p:sp>
+        <p:nvSpPr>
+          <p:cNvPr id="52" name="文本框 51"/>
+          <p:cNvSpPr txBox="1"/>
+          <p:nvPr/>
+        </p:nvSpPr>
+        <p:spPr>
+          <a:xfrm>
+            <a:off x="1369346" y="1377348"/>
+            <a:ext cx="1021433" cy="215444"/>
+          </a:xfrm>
+          <a:prstGeom prst="rect">
+            <a:avLst/>
+          </a:prstGeom>
+          <a:noFill/>
+        </p:spPr>
+        <p:txBody>
+          <a:bodyPr wrap="none" rtlCol="0">
+            <a:spAutoFit/>
+          </a:bodyPr>
+          <a:lstStyle/>
+          <a:p>
+            <a:r>
+              <a:rPr lang="en-US" altLang="zh-CN" sz="800" dirty="0" smtClean="0"/>
+              <a:t>32-bit </a:t>
+            </a:r>
+            <a:r>
+              <a:rPr lang="en-US" altLang="zh-CN" sz="800" dirty="0" smtClean="0"/>
+              <a:t>weight buffer</a:t>
             </a:r>
             <a:endParaRPr lang="zh-CN" altLang="en-US" sz="800" dirty="0"/>
           </a:p>

</xml_diff>